<commit_message>
Updated Lunch with the devs and model review meeting details
</commit_message>
<xml_diff>
--- a/docs/static/presentations/oscal-leveraged-authorizations-v3.pptx
+++ b/docs/static/presentations/oscal-leveraged-authorizations-v3.pptx
@@ -170,1944 +170,6 @@
 </p1510:revInfo>
 </file>
 
-<file path=ppt/changesInfos/changesInfo1.xml><?xml version="1.0" encoding="utf-8"?>
-<pc:chgInfo xmlns:a="http://schemas.openxmlformats.org/drawingml/2006/main" xmlns:r="http://schemas.openxmlformats.org/officeDocument/2006/relationships" xmlns:ac="http://schemas.microsoft.com/office/drawing/2013/main/command" xmlns:pc="http://schemas.microsoft.com/office/powerpoint/2013/main/command">
-  <pc:docChgLst>
-    <pc:chgData name="Brian" userId="a446eaa4-2b2b-40d1-a374-c5d2218596f9" providerId="ADAL" clId="{834F166D-138A-4F4A-991E-5A1CCBD4EFE3}"/>
-    <pc:docChg chg="undo custSel addSld modSld modSection">
-      <pc:chgData name="Brian" userId="a446eaa4-2b2b-40d1-a374-c5d2218596f9" providerId="ADAL" clId="{834F166D-138A-4F4A-991E-5A1CCBD4EFE3}" dt="2020-07-24T14:01:56.600" v="151" actId="1036"/>
-      <pc:docMkLst>
-        <pc:docMk/>
-      </pc:docMkLst>
-      <pc:sldChg chg="modSp mod">
-        <pc:chgData name="Brian" userId="a446eaa4-2b2b-40d1-a374-c5d2218596f9" providerId="ADAL" clId="{834F166D-138A-4F4A-991E-5A1CCBD4EFE3}" dt="2020-07-24T14:01:56.600" v="151" actId="1036"/>
-        <pc:sldMkLst>
-          <pc:docMk/>
-          <pc:sldMk cId="2945989702" sldId="616"/>
-        </pc:sldMkLst>
-        <pc:picChg chg="mod">
-          <ac:chgData name="Brian" userId="a446eaa4-2b2b-40d1-a374-c5d2218596f9" providerId="ADAL" clId="{834F166D-138A-4F4A-991E-5A1CCBD4EFE3}" dt="2020-07-24T14:01:56.600" v="151" actId="1036"/>
-          <ac:picMkLst>
-            <pc:docMk/>
-            <pc:sldMk cId="2945989702" sldId="616"/>
-            <ac:picMk id="4" creationId="{153A16E6-4902-406C-94D0-B8327D38B156}"/>
-          </ac:picMkLst>
-        </pc:picChg>
-      </pc:sldChg>
-      <pc:sldChg chg="addSp delSp modSp add mod delAnim modAnim">
-        <pc:chgData name="Brian" userId="a446eaa4-2b2b-40d1-a374-c5d2218596f9" providerId="ADAL" clId="{834F166D-138A-4F4A-991E-5A1CCBD4EFE3}" dt="2020-07-24T14:01:28.753" v="130" actId="478"/>
-        <pc:sldMkLst>
-          <pc:docMk/>
-          <pc:sldMk cId="1016200983" sldId="619"/>
-        </pc:sldMkLst>
-        <pc:spChg chg="del">
-          <ac:chgData name="Brian" userId="a446eaa4-2b2b-40d1-a374-c5d2218596f9" providerId="ADAL" clId="{834F166D-138A-4F4A-991E-5A1CCBD4EFE3}" dt="2020-07-24T13:57:52.785" v="1" actId="478"/>
-          <ac:spMkLst>
-            <pc:docMk/>
-            <pc:sldMk cId="1016200983" sldId="619"/>
-            <ac:spMk id="8" creationId="{04984240-606D-4298-B612-2249915719CE}"/>
-          </ac:spMkLst>
-        </pc:spChg>
-        <pc:picChg chg="mod">
-          <ac:chgData name="Brian" userId="a446eaa4-2b2b-40d1-a374-c5d2218596f9" providerId="ADAL" clId="{834F166D-138A-4F4A-991E-5A1CCBD4EFE3}" dt="2020-07-24T13:58:26.095" v="83" actId="1038"/>
-          <ac:picMkLst>
-            <pc:docMk/>
-            <pc:sldMk cId="1016200983" sldId="619"/>
-            <ac:picMk id="4" creationId="{153A16E6-4902-406C-94D0-B8327D38B156}"/>
-          </ac:picMkLst>
-        </pc:picChg>
-        <pc:picChg chg="add del mod">
-          <ac:chgData name="Brian" userId="a446eaa4-2b2b-40d1-a374-c5d2218596f9" providerId="ADAL" clId="{834F166D-138A-4F4A-991E-5A1CCBD4EFE3}" dt="2020-07-24T14:00:33.256" v="107" actId="478"/>
-          <ac:picMkLst>
-            <pc:docMk/>
-            <pc:sldMk cId="1016200983" sldId="619"/>
-            <ac:picMk id="6" creationId="{B066C52D-BB92-46FA-8A91-726193DF4391}"/>
-          </ac:picMkLst>
-        </pc:picChg>
-        <pc:picChg chg="add mod">
-          <ac:chgData name="Brian" userId="a446eaa4-2b2b-40d1-a374-c5d2218596f9" providerId="ADAL" clId="{834F166D-138A-4F4A-991E-5A1CCBD4EFE3}" dt="2020-07-24T14:01:08.862" v="126" actId="1037"/>
-          <ac:picMkLst>
-            <pc:docMk/>
-            <pc:sldMk cId="1016200983" sldId="619"/>
-            <ac:picMk id="14" creationId="{B86D5392-A625-4EDA-BF8C-0BF88E9BFF9B}"/>
-          </ac:picMkLst>
-        </pc:picChg>
-        <pc:cxnChg chg="add del mod ord">
-          <ac:chgData name="Brian" userId="a446eaa4-2b2b-40d1-a374-c5d2218596f9" providerId="ADAL" clId="{834F166D-138A-4F4A-991E-5A1CCBD4EFE3}" dt="2020-07-24T14:01:28.753" v="130" actId="478"/>
-          <ac:cxnSpMkLst>
-            <pc:docMk/>
-            <pc:sldMk cId="1016200983" sldId="619"/>
-            <ac:cxnSpMk id="9" creationId="{98E606F9-6542-47C6-A093-296972B61D12}"/>
-          </ac:cxnSpMkLst>
-        </pc:cxnChg>
-        <pc:cxnChg chg="add del mod ord">
-          <ac:chgData name="Brian" userId="a446eaa4-2b2b-40d1-a374-c5d2218596f9" providerId="ADAL" clId="{834F166D-138A-4F4A-991E-5A1CCBD4EFE3}" dt="2020-07-24T14:01:28.753" v="130" actId="478"/>
-          <ac:cxnSpMkLst>
-            <pc:docMk/>
-            <pc:sldMk cId="1016200983" sldId="619"/>
-            <ac:cxnSpMk id="10" creationId="{927E9055-3073-491A-B1B0-77F506B42BED}"/>
-          </ac:cxnSpMkLst>
-        </pc:cxnChg>
-        <pc:cxnChg chg="add del mod">
-          <ac:chgData name="Brian" userId="a446eaa4-2b2b-40d1-a374-c5d2218596f9" providerId="ADAL" clId="{834F166D-138A-4F4A-991E-5A1CCBD4EFE3}" dt="2020-07-24T14:01:25.937" v="129" actId="478"/>
-          <ac:cxnSpMkLst>
-            <pc:docMk/>
-            <pc:sldMk cId="1016200983" sldId="619"/>
-            <ac:cxnSpMk id="15" creationId="{79767A7B-FA9C-4ED2-BEE8-0A7AD517BC05}"/>
-          </ac:cxnSpMkLst>
-        </pc:cxnChg>
-        <pc:cxnChg chg="add del mod">
-          <ac:chgData name="Brian" userId="a446eaa4-2b2b-40d1-a374-c5d2218596f9" providerId="ADAL" clId="{834F166D-138A-4F4A-991E-5A1CCBD4EFE3}" dt="2020-07-24T14:01:25.937" v="129" actId="478"/>
-          <ac:cxnSpMkLst>
-            <pc:docMk/>
-            <pc:sldMk cId="1016200983" sldId="619"/>
-            <ac:cxnSpMk id="16" creationId="{32278593-3739-4EAE-A73E-01C7C49CC575}"/>
-          </ac:cxnSpMkLst>
-        </pc:cxnChg>
-      </pc:sldChg>
-    </pc:docChg>
-  </pc:docChgLst>
-  <pc:docChgLst>
-    <pc:chgData name="Brian" userId="a446eaa4-2b2b-40d1-a374-c5d2218596f9" providerId="ADAL" clId="{6193FA36-BBCC-4CBD-8E72-E7FCBD9CDBC8}"/>
-    <pc:docChg chg="undo custSel modSld">
-      <pc:chgData name="Brian" userId="a446eaa4-2b2b-40d1-a374-c5d2218596f9" providerId="ADAL" clId="{6193FA36-BBCC-4CBD-8E72-E7FCBD9CDBC8}" dt="2020-07-17T22:25:53.605" v="3055" actId="20577"/>
-      <pc:docMkLst>
-        <pc:docMk/>
-      </pc:docMkLst>
-      <pc:sldChg chg="addSp delSp modSp mod">
-        <pc:chgData name="Brian" userId="a446eaa4-2b2b-40d1-a374-c5d2218596f9" providerId="ADAL" clId="{6193FA36-BBCC-4CBD-8E72-E7FCBD9CDBC8}" dt="2020-07-16T18:58:36.549" v="193" actId="27636"/>
-        <pc:sldMkLst>
-          <pc:docMk/>
-          <pc:sldMk cId="3741355342" sldId="350"/>
-        </pc:sldMkLst>
-        <pc:spChg chg="mod">
-          <ac:chgData name="Brian" userId="a446eaa4-2b2b-40d1-a374-c5d2218596f9" providerId="ADAL" clId="{6193FA36-BBCC-4CBD-8E72-E7FCBD9CDBC8}" dt="2020-07-16T18:58:36.549" v="193" actId="27636"/>
-          <ac:spMkLst>
-            <pc:docMk/>
-            <pc:sldMk cId="3741355342" sldId="350"/>
-            <ac:spMk id="3" creationId="{BECE8024-974D-4F8C-AD39-F5789DDD8A5F}"/>
-          </ac:spMkLst>
-        </pc:spChg>
-        <pc:picChg chg="add mod">
-          <ac:chgData name="Brian" userId="a446eaa4-2b2b-40d1-a374-c5d2218596f9" providerId="ADAL" clId="{6193FA36-BBCC-4CBD-8E72-E7FCBD9CDBC8}" dt="2020-07-16T18:55:33.728" v="3" actId="1076"/>
-          <ac:picMkLst>
-            <pc:docMk/>
-            <pc:sldMk cId="3741355342" sldId="350"/>
-            <ac:picMk id="7" creationId="{D9C9B132-5CC6-4DC3-938D-026CAEF53C0F}"/>
-          </ac:picMkLst>
-        </pc:picChg>
-        <pc:picChg chg="del">
-          <ac:chgData name="Brian" userId="a446eaa4-2b2b-40d1-a374-c5d2218596f9" providerId="ADAL" clId="{6193FA36-BBCC-4CBD-8E72-E7FCBD9CDBC8}" dt="2020-07-16T18:55:23.588" v="0" actId="478"/>
-          <ac:picMkLst>
-            <pc:docMk/>
-            <pc:sldMk cId="3741355342" sldId="350"/>
-            <ac:picMk id="8" creationId="{00000000-0000-0000-0000-000000000000}"/>
-          </ac:picMkLst>
-        </pc:picChg>
-      </pc:sldChg>
-      <pc:sldChg chg="addSp delSp modSp mod">
-        <pc:chgData name="Brian" userId="a446eaa4-2b2b-40d1-a374-c5d2218596f9" providerId="ADAL" clId="{6193FA36-BBCC-4CBD-8E72-E7FCBD9CDBC8}" dt="2020-07-16T19:00:42.316" v="469" actId="15"/>
-        <pc:sldMkLst>
-          <pc:docMk/>
-          <pc:sldMk cId="2424860289" sldId="356"/>
-        </pc:sldMkLst>
-        <pc:spChg chg="add mod">
-          <ac:chgData name="Brian" userId="a446eaa4-2b2b-40d1-a374-c5d2218596f9" providerId="ADAL" clId="{6193FA36-BBCC-4CBD-8E72-E7FCBD9CDBC8}" dt="2020-07-16T19:00:42.316" v="469" actId="15"/>
-          <ac:spMkLst>
-            <pc:docMk/>
-            <pc:sldMk cId="2424860289" sldId="356"/>
-            <ac:spMk id="7" creationId="{A6554978-A9A5-4E24-B95A-2F2E0E7970D0}"/>
-          </ac:spMkLst>
-        </pc:spChg>
-        <pc:picChg chg="del">
-          <ac:chgData name="Brian" userId="a446eaa4-2b2b-40d1-a374-c5d2218596f9" providerId="ADAL" clId="{6193FA36-BBCC-4CBD-8E72-E7FCBD9CDBC8}" dt="2020-07-16T18:56:27.534" v="4" actId="478"/>
-          <ac:picMkLst>
-            <pc:docMk/>
-            <pc:sldMk cId="2424860289" sldId="356"/>
-            <ac:picMk id="3" creationId="{00000000-0000-0000-0000-000000000000}"/>
-          </ac:picMkLst>
-        </pc:picChg>
-        <pc:picChg chg="add mod">
-          <ac:chgData name="Brian" userId="a446eaa4-2b2b-40d1-a374-c5d2218596f9" providerId="ADAL" clId="{6193FA36-BBCC-4CBD-8E72-E7FCBD9CDBC8}" dt="2020-07-16T18:56:32.963" v="6" actId="1076"/>
-          <ac:picMkLst>
-            <pc:docMk/>
-            <pc:sldMk cId="2424860289" sldId="356"/>
-            <ac:picMk id="6" creationId="{1BE0FEB3-974C-48D1-9D1F-04046AC3E06E}"/>
-          </ac:picMkLst>
-        </pc:picChg>
-      </pc:sldChg>
-      <pc:sldChg chg="addSp delSp modSp mod">
-        <pc:chgData name="Brian" userId="a446eaa4-2b2b-40d1-a374-c5d2218596f9" providerId="ADAL" clId="{6193FA36-BBCC-4CBD-8E72-E7FCBD9CDBC8}" dt="2020-07-16T19:02:58.526" v="474" actId="1076"/>
-        <pc:sldMkLst>
-          <pc:docMk/>
-          <pc:sldMk cId="1857018149" sldId="596"/>
-        </pc:sldMkLst>
-        <pc:picChg chg="del">
-          <ac:chgData name="Brian" userId="a446eaa4-2b2b-40d1-a374-c5d2218596f9" providerId="ADAL" clId="{6193FA36-BBCC-4CBD-8E72-E7FCBD9CDBC8}" dt="2020-07-16T19:02:49.687" v="470" actId="478"/>
-          <ac:picMkLst>
-            <pc:docMk/>
-            <pc:sldMk cId="1857018149" sldId="596"/>
-            <ac:picMk id="4" creationId="{00000000-0000-0000-0000-000000000000}"/>
-          </ac:picMkLst>
-        </pc:picChg>
-        <pc:picChg chg="add mod">
-          <ac:chgData name="Brian" userId="a446eaa4-2b2b-40d1-a374-c5d2218596f9" providerId="ADAL" clId="{6193FA36-BBCC-4CBD-8E72-E7FCBD9CDBC8}" dt="2020-07-16T19:02:58.526" v="474" actId="1076"/>
-          <ac:picMkLst>
-            <pc:docMk/>
-            <pc:sldMk cId="1857018149" sldId="596"/>
-            <ac:picMk id="7" creationId="{D7ADD5CA-B2DC-46BA-8A07-D4FFF5CE0F23}"/>
-          </ac:picMkLst>
-        </pc:picChg>
-      </pc:sldChg>
-      <pc:sldChg chg="addSp delSp modSp mod">
-        <pc:chgData name="Brian" userId="a446eaa4-2b2b-40d1-a374-c5d2218596f9" providerId="ADAL" clId="{6193FA36-BBCC-4CBD-8E72-E7FCBD9CDBC8}" dt="2020-07-17T21:55:09.447" v="561" actId="14100"/>
-        <pc:sldMkLst>
-          <pc:docMk/>
-          <pc:sldMk cId="1016450660" sldId="597"/>
-        </pc:sldMkLst>
-        <pc:picChg chg="del">
-          <ac:chgData name="Brian" userId="a446eaa4-2b2b-40d1-a374-c5d2218596f9" providerId="ADAL" clId="{6193FA36-BBCC-4CBD-8E72-E7FCBD9CDBC8}" dt="2020-07-17T01:01:26.937" v="536" actId="478"/>
-          <ac:picMkLst>
-            <pc:docMk/>
-            <pc:sldMk cId="1016450660" sldId="597"/>
-            <ac:picMk id="4" creationId="{00000000-0000-0000-0000-000000000000}"/>
-          </ac:picMkLst>
-        </pc:picChg>
-        <pc:picChg chg="add mod">
-          <ac:chgData name="Brian" userId="a446eaa4-2b2b-40d1-a374-c5d2218596f9" providerId="ADAL" clId="{6193FA36-BBCC-4CBD-8E72-E7FCBD9CDBC8}" dt="2020-07-17T21:55:09.447" v="561" actId="14100"/>
-          <ac:picMkLst>
-            <pc:docMk/>
-            <pc:sldMk cId="1016450660" sldId="597"/>
-            <ac:picMk id="4" creationId="{031E6843-713F-4B97-B1EA-D05D2AB17E03}"/>
-          </ac:picMkLst>
-        </pc:picChg>
-        <pc:picChg chg="add del mod">
-          <ac:chgData name="Brian" userId="a446eaa4-2b2b-40d1-a374-c5d2218596f9" providerId="ADAL" clId="{6193FA36-BBCC-4CBD-8E72-E7FCBD9CDBC8}" dt="2020-07-17T21:55:03.569" v="558" actId="478"/>
-          <ac:picMkLst>
-            <pc:docMk/>
-            <pc:sldMk cId="1016450660" sldId="597"/>
-            <ac:picMk id="6" creationId="{EDC8B133-2F72-4B25-94FA-215E2445B32A}"/>
-          </ac:picMkLst>
-        </pc:picChg>
-      </pc:sldChg>
-      <pc:sldChg chg="addSp delSp modSp mod">
-        <pc:chgData name="Brian" userId="a446eaa4-2b2b-40d1-a374-c5d2218596f9" providerId="ADAL" clId="{6193FA36-BBCC-4CBD-8E72-E7FCBD9CDBC8}" dt="2020-07-17T00:45:21.776" v="535" actId="1036"/>
-        <pc:sldMkLst>
-          <pc:docMk/>
-          <pc:sldMk cId="2869412446" sldId="598"/>
-        </pc:sldMkLst>
-        <pc:spChg chg="mod ord">
-          <ac:chgData name="Brian" userId="a446eaa4-2b2b-40d1-a374-c5d2218596f9" providerId="ADAL" clId="{6193FA36-BBCC-4CBD-8E72-E7FCBD9CDBC8}" dt="2020-07-17T00:45:09.675" v="520" actId="166"/>
-          <ac:spMkLst>
-            <pc:docMk/>
-            <pc:sldMk cId="2869412446" sldId="598"/>
-            <ac:spMk id="8" creationId="{00000000-0000-0000-0000-000000000000}"/>
-          </ac:spMkLst>
-        </pc:spChg>
-        <pc:spChg chg="mod ord">
-          <ac:chgData name="Brian" userId="a446eaa4-2b2b-40d1-a374-c5d2218596f9" providerId="ADAL" clId="{6193FA36-BBCC-4CBD-8E72-E7FCBD9CDBC8}" dt="2020-07-17T00:45:21.776" v="535" actId="1036"/>
-          <ac:spMkLst>
-            <pc:docMk/>
-            <pc:sldMk cId="2869412446" sldId="598"/>
-            <ac:spMk id="9" creationId="{00000000-0000-0000-0000-000000000000}"/>
-          </ac:spMkLst>
-        </pc:spChg>
-        <pc:picChg chg="add del">
-          <ac:chgData name="Brian" userId="a446eaa4-2b2b-40d1-a374-c5d2218596f9" providerId="ADAL" clId="{6193FA36-BBCC-4CBD-8E72-E7FCBD9CDBC8}" dt="2020-07-17T00:43:59.640" v="481" actId="478"/>
-          <ac:picMkLst>
-            <pc:docMk/>
-            <pc:sldMk cId="2869412446" sldId="598"/>
-            <ac:picMk id="4" creationId="{00000000-0000-0000-0000-000000000000}"/>
-          </ac:picMkLst>
-        </pc:picChg>
-        <pc:picChg chg="add del mod">
-          <ac:chgData name="Brian" userId="a446eaa4-2b2b-40d1-a374-c5d2218596f9" providerId="ADAL" clId="{6193FA36-BBCC-4CBD-8E72-E7FCBD9CDBC8}" dt="2020-07-16T20:04:01.723" v="479" actId="22"/>
-          <ac:picMkLst>
-            <pc:docMk/>
-            <pc:sldMk cId="2869412446" sldId="598"/>
-            <ac:picMk id="6" creationId="{7AA55F94-EB29-477B-B2E6-28518B1B1C84}"/>
-          </ac:picMkLst>
-        </pc:picChg>
-        <pc:picChg chg="add mod">
-          <ac:chgData name="Brian" userId="a446eaa4-2b2b-40d1-a374-c5d2218596f9" providerId="ADAL" clId="{6193FA36-BBCC-4CBD-8E72-E7FCBD9CDBC8}" dt="2020-07-17T00:44:27.503" v="500" actId="1037"/>
-          <ac:picMkLst>
-            <pc:docMk/>
-            <pc:sldMk cId="2869412446" sldId="598"/>
-            <ac:picMk id="12" creationId="{6D73D674-7E06-4CAD-A96C-489E2FA1B835}"/>
-          </ac:picMkLst>
-        </pc:picChg>
-      </pc:sldChg>
-      <pc:sldChg chg="addSp delSp modSp mod">
-        <pc:chgData name="Brian" userId="a446eaa4-2b2b-40d1-a374-c5d2218596f9" providerId="ADAL" clId="{6193FA36-BBCC-4CBD-8E72-E7FCBD9CDBC8}" dt="2020-07-17T22:07:51.009" v="1080" actId="20577"/>
-        <pc:sldMkLst>
-          <pc:docMk/>
-          <pc:sldMk cId="799062" sldId="599"/>
-        </pc:sldMkLst>
-        <pc:spChg chg="mod">
-          <ac:chgData name="Brian" userId="a446eaa4-2b2b-40d1-a374-c5d2218596f9" providerId="ADAL" clId="{6193FA36-BBCC-4CBD-8E72-E7FCBD9CDBC8}" dt="2020-07-17T01:40:58.887" v="545" actId="121"/>
-          <ac:spMkLst>
-            <pc:docMk/>
-            <pc:sldMk cId="799062" sldId="599"/>
-            <ac:spMk id="2" creationId="{347BC2CA-3CCA-4704-BAB4-82F3517B63FD}"/>
-          </ac:spMkLst>
-        </pc:spChg>
-        <pc:spChg chg="add mod ord">
-          <ac:chgData name="Brian" userId="a446eaa4-2b2b-40d1-a374-c5d2218596f9" providerId="ADAL" clId="{6193FA36-BBCC-4CBD-8E72-E7FCBD9CDBC8}" dt="2020-07-17T22:07:51.009" v="1080" actId="20577"/>
-          <ac:spMkLst>
-            <pc:docMk/>
-            <pc:sldMk cId="799062" sldId="599"/>
-            <ac:spMk id="3" creationId="{294DBB52-CCAD-4918-A0E2-07FDF5EDE867}"/>
-          </ac:spMkLst>
-        </pc:spChg>
-        <pc:picChg chg="add del mod">
-          <ac:chgData name="Brian" userId="a446eaa4-2b2b-40d1-a374-c5d2218596f9" providerId="ADAL" clId="{6193FA36-BBCC-4CBD-8E72-E7FCBD9CDBC8}" dt="2020-07-17T01:41:22.643" v="546" actId="478"/>
-          <ac:picMkLst>
-            <pc:docMk/>
-            <pc:sldMk cId="799062" sldId="599"/>
-            <ac:picMk id="4" creationId="{EA5D6410-CC11-4F90-A36C-C523776C1186}"/>
-          </ac:picMkLst>
-        </pc:picChg>
-        <pc:picChg chg="del">
-          <ac:chgData name="Brian" userId="a446eaa4-2b2b-40d1-a374-c5d2218596f9" providerId="ADAL" clId="{6193FA36-BBCC-4CBD-8E72-E7FCBD9CDBC8}" dt="2020-07-17T01:36:26.267" v="540" actId="478"/>
-          <ac:picMkLst>
-            <pc:docMk/>
-            <pc:sldMk cId="799062" sldId="599"/>
-            <ac:picMk id="7" creationId="{00000000-0000-0000-0000-000000000000}"/>
-          </ac:picMkLst>
-        </pc:picChg>
-        <pc:picChg chg="add mod">
-          <ac:chgData name="Brian" userId="a446eaa4-2b2b-40d1-a374-c5d2218596f9" providerId="ADAL" clId="{6193FA36-BBCC-4CBD-8E72-E7FCBD9CDBC8}" dt="2020-07-17T22:02:55.751" v="582" actId="1076"/>
-          <ac:picMkLst>
-            <pc:docMk/>
-            <pc:sldMk cId="799062" sldId="599"/>
-            <ac:picMk id="7" creationId="{13E11E42-8D1E-4A72-91C4-95E8DE45CA7C}"/>
-          </ac:picMkLst>
-        </pc:picChg>
-        <pc:picChg chg="add del mod">
-          <ac:chgData name="Brian" userId="a446eaa4-2b2b-40d1-a374-c5d2218596f9" providerId="ADAL" clId="{6193FA36-BBCC-4CBD-8E72-E7FCBD9CDBC8}" dt="2020-07-17T22:02:41.560" v="577" actId="478"/>
-          <ac:picMkLst>
-            <pc:docMk/>
-            <pc:sldMk cId="799062" sldId="599"/>
-            <ac:picMk id="8" creationId="{5410CD6D-DBAA-4DA8-93D2-9121A3428774}"/>
-          </ac:picMkLst>
-        </pc:picChg>
-      </pc:sldChg>
-      <pc:sldChg chg="addSp delSp modSp mod">
-        <pc:chgData name="Brian" userId="a446eaa4-2b2b-40d1-a374-c5d2218596f9" providerId="ADAL" clId="{6193FA36-BBCC-4CBD-8E72-E7FCBD9CDBC8}" dt="2020-07-17T22:18:19.864" v="2164" actId="14100"/>
-        <pc:sldMkLst>
-          <pc:docMk/>
-          <pc:sldMk cId="3318435924" sldId="600"/>
-        </pc:sldMkLst>
-        <pc:spChg chg="add del mod">
-          <ac:chgData name="Brian" userId="a446eaa4-2b2b-40d1-a374-c5d2218596f9" providerId="ADAL" clId="{6193FA36-BBCC-4CBD-8E72-E7FCBD9CDBC8}" dt="2020-07-17T22:09:40.887" v="1103" actId="478"/>
-          <ac:spMkLst>
-            <pc:docMk/>
-            <pc:sldMk cId="3318435924" sldId="600"/>
-            <ac:spMk id="8" creationId="{4B0E1993-12DF-4E40-84C0-5EFFDC886148}"/>
-          </ac:spMkLst>
-        </pc:spChg>
-        <pc:spChg chg="add mod">
-          <ac:chgData name="Brian" userId="a446eaa4-2b2b-40d1-a374-c5d2218596f9" providerId="ADAL" clId="{6193FA36-BBCC-4CBD-8E72-E7FCBD9CDBC8}" dt="2020-07-17T22:17:38.734" v="2160" actId="20577"/>
-          <ac:spMkLst>
-            <pc:docMk/>
-            <pc:sldMk cId="3318435924" sldId="600"/>
-            <ac:spMk id="10" creationId="{695408AA-DDCE-4345-82B1-C549F316BEDE}"/>
-          </ac:spMkLst>
-        </pc:spChg>
-        <pc:picChg chg="del">
-          <ac:chgData name="Brian" userId="a446eaa4-2b2b-40d1-a374-c5d2218596f9" providerId="ADAL" clId="{6193FA36-BBCC-4CBD-8E72-E7FCBD9CDBC8}" dt="2020-07-17T21:51:43.546" v="549" actId="478"/>
-          <ac:picMkLst>
-            <pc:docMk/>
-            <pc:sldMk cId="3318435924" sldId="600"/>
-            <ac:picMk id="3" creationId="{00000000-0000-0000-0000-000000000000}"/>
-          </ac:picMkLst>
-        </pc:picChg>
-        <pc:picChg chg="add del mod">
-          <ac:chgData name="Brian" userId="a446eaa4-2b2b-40d1-a374-c5d2218596f9" providerId="ADAL" clId="{6193FA36-BBCC-4CBD-8E72-E7FCBD9CDBC8}" dt="2020-07-17T22:18:14.182" v="2161" actId="478"/>
-          <ac:picMkLst>
-            <pc:docMk/>
-            <pc:sldMk cId="3318435924" sldId="600"/>
-            <ac:picMk id="6" creationId="{8413A40A-BA5C-4639-B27C-F1AC3AE5A900}"/>
-          </ac:picMkLst>
-        </pc:picChg>
-        <pc:picChg chg="add mod">
-          <ac:chgData name="Brian" userId="a446eaa4-2b2b-40d1-a374-c5d2218596f9" providerId="ADAL" clId="{6193FA36-BBCC-4CBD-8E72-E7FCBD9CDBC8}" dt="2020-07-17T22:18:19.864" v="2164" actId="14100"/>
-          <ac:picMkLst>
-            <pc:docMk/>
-            <pc:sldMk cId="3318435924" sldId="600"/>
-            <ac:picMk id="12" creationId="{FBC2CF12-6C30-4FA3-87C0-5A7EB71658A5}"/>
-          </ac:picMkLst>
-        </pc:picChg>
-      </pc:sldChg>
-      <pc:sldChg chg="addSp delSp modSp mod">
-        <pc:chgData name="Brian" userId="a446eaa4-2b2b-40d1-a374-c5d2218596f9" providerId="ADAL" clId="{6193FA36-BBCC-4CBD-8E72-E7FCBD9CDBC8}" dt="2020-07-17T22:25:53.605" v="3055" actId="20577"/>
-        <pc:sldMkLst>
-          <pc:docMk/>
-          <pc:sldMk cId="1792065074" sldId="601"/>
-        </pc:sldMkLst>
-        <pc:spChg chg="add mod">
-          <ac:chgData name="Brian" userId="a446eaa4-2b2b-40d1-a374-c5d2218596f9" providerId="ADAL" clId="{6193FA36-BBCC-4CBD-8E72-E7FCBD9CDBC8}" dt="2020-07-17T22:25:53.605" v="3055" actId="20577"/>
-          <ac:spMkLst>
-            <pc:docMk/>
-            <pc:sldMk cId="1792065074" sldId="601"/>
-            <ac:spMk id="8" creationId="{04984240-606D-4298-B612-2249915719CE}"/>
-          </ac:spMkLst>
-        </pc:spChg>
-        <pc:picChg chg="del">
-          <ac:chgData name="Brian" userId="a446eaa4-2b2b-40d1-a374-c5d2218596f9" providerId="ADAL" clId="{6193FA36-BBCC-4CBD-8E72-E7FCBD9CDBC8}" dt="2020-07-17T21:53:33.529" v="553" actId="478"/>
-          <ac:picMkLst>
-            <pc:docMk/>
-            <pc:sldMk cId="1792065074" sldId="601"/>
-            <ac:picMk id="3" creationId="{00000000-0000-0000-0000-000000000000}"/>
-          </ac:picMkLst>
-        </pc:picChg>
-        <pc:picChg chg="add del mod">
-          <ac:chgData name="Brian" userId="a446eaa4-2b2b-40d1-a374-c5d2218596f9" providerId="ADAL" clId="{6193FA36-BBCC-4CBD-8E72-E7FCBD9CDBC8}" dt="2020-07-17T22:22:04.934" v="2422" actId="478"/>
-          <ac:picMkLst>
-            <pc:docMk/>
-            <pc:sldMk cId="1792065074" sldId="601"/>
-            <ac:picMk id="6" creationId="{D6D2AD4A-51CD-4436-A049-524E86D2014F}"/>
-          </ac:picMkLst>
-        </pc:picChg>
-        <pc:picChg chg="add mod">
-          <ac:chgData name="Brian" userId="a446eaa4-2b2b-40d1-a374-c5d2218596f9" providerId="ADAL" clId="{6193FA36-BBCC-4CBD-8E72-E7FCBD9CDBC8}" dt="2020-07-17T22:22:11.531" v="2425" actId="1076"/>
-          <ac:picMkLst>
-            <pc:docMk/>
-            <pc:sldMk cId="1792065074" sldId="601"/>
-            <ac:picMk id="10" creationId="{B22991D6-F0AF-4AEF-9153-958A18DAE302}"/>
-          </ac:picMkLst>
-        </pc:picChg>
-      </pc:sldChg>
-    </pc:docChg>
-  </pc:docChgLst>
-  <pc:docChgLst>
-    <pc:chgData name="Brian" userId="a446eaa4-2b2b-40d1-a374-c5d2218596f9" providerId="ADAL" clId="{4183866A-C8FF-41BE-9C12-512EFF0AA624}"/>
-    <pc:docChg chg="undo custSel addSld delSld modSld sldOrd modSection">
-      <pc:chgData name="Brian" userId="a446eaa4-2b2b-40d1-a374-c5d2218596f9" providerId="ADAL" clId="{4183866A-C8FF-41BE-9C12-512EFF0AA624}" dt="2020-08-07T13:36:33.533" v="5983" actId="14100"/>
-      <pc:docMkLst>
-        <pc:docMk/>
-      </pc:docMkLst>
-      <pc:sldChg chg="modSp mod">
-        <pc:chgData name="Brian" userId="a446eaa4-2b2b-40d1-a374-c5d2218596f9" providerId="ADAL" clId="{4183866A-C8FF-41BE-9C12-512EFF0AA624}" dt="2020-08-05T00:57:39.824" v="28" actId="27636"/>
-        <pc:sldMkLst>
-          <pc:docMk/>
-          <pc:sldMk cId="1238351807" sldId="256"/>
-        </pc:sldMkLst>
-        <pc:spChg chg="mod">
-          <ac:chgData name="Brian" userId="a446eaa4-2b2b-40d1-a374-c5d2218596f9" providerId="ADAL" clId="{4183866A-C8FF-41BE-9C12-512EFF0AA624}" dt="2020-08-05T00:57:39.824" v="28" actId="27636"/>
-          <ac:spMkLst>
-            <pc:docMk/>
-            <pc:sldMk cId="1238351807" sldId="256"/>
-            <ac:spMk id="3" creationId="{3E7B73A2-F6BA-4D97-8687-A20A69DB2A09}"/>
-          </ac:spMkLst>
-        </pc:spChg>
-      </pc:sldChg>
-      <pc:sldChg chg="addSp delSp modSp mod">
-        <pc:chgData name="Brian" userId="a446eaa4-2b2b-40d1-a374-c5d2218596f9" providerId="ADAL" clId="{4183866A-C8FF-41BE-9C12-512EFF0AA624}" dt="2020-08-06T14:36:58.557" v="2061" actId="478"/>
-        <pc:sldMkLst>
-          <pc:docMk/>
-          <pc:sldMk cId="2491124764" sldId="377"/>
-        </pc:sldMkLst>
-        <pc:picChg chg="add mod">
-          <ac:chgData name="Brian" userId="a446eaa4-2b2b-40d1-a374-c5d2218596f9" providerId="ADAL" clId="{4183866A-C8FF-41BE-9C12-512EFF0AA624}" dt="2020-08-06T14:36:55.823" v="2060" actId="1038"/>
-          <ac:picMkLst>
-            <pc:docMk/>
-            <pc:sldMk cId="2491124764" sldId="377"/>
-            <ac:picMk id="4" creationId="{5ABBD0F9-75B3-4B91-8A34-5EB526A93DA8}"/>
-          </ac:picMkLst>
-        </pc:picChg>
-        <pc:picChg chg="del">
-          <ac:chgData name="Brian" userId="a446eaa4-2b2b-40d1-a374-c5d2218596f9" providerId="ADAL" clId="{4183866A-C8FF-41BE-9C12-512EFF0AA624}" dt="2020-08-06T14:36:58.557" v="2061" actId="478"/>
-          <ac:picMkLst>
-            <pc:docMk/>
-            <pc:sldMk cId="2491124764" sldId="377"/>
-            <ac:picMk id="8" creationId="{09AA11B5-85C4-4DB0-8FDD-D02EB404BCD9}"/>
-          </ac:picMkLst>
-        </pc:picChg>
-      </pc:sldChg>
-      <pc:sldChg chg="addSp delSp modSp del mod">
-        <pc:chgData name="Brian" userId="a446eaa4-2b2b-40d1-a374-c5d2218596f9" providerId="ADAL" clId="{4183866A-C8FF-41BE-9C12-512EFF0AA624}" dt="2020-08-06T14:40:24.034" v="2062" actId="47"/>
-        <pc:sldMkLst>
-          <pc:docMk/>
-          <pc:sldMk cId="3617648204" sldId="602"/>
-        </pc:sldMkLst>
-        <pc:spChg chg="mod">
-          <ac:chgData name="Brian" userId="a446eaa4-2b2b-40d1-a374-c5d2218596f9" providerId="ADAL" clId="{4183866A-C8FF-41BE-9C12-512EFF0AA624}" dt="2020-08-06T14:35:24.430" v="2052" actId="20577"/>
-          <ac:spMkLst>
-            <pc:docMk/>
-            <pc:sldMk cId="3617648204" sldId="602"/>
-            <ac:spMk id="2" creationId="{347BC2CA-3CCA-4704-BAB4-82F3517B63FD}"/>
-          </ac:spMkLst>
-        </pc:spChg>
-        <pc:picChg chg="add del">
-          <ac:chgData name="Brian" userId="a446eaa4-2b2b-40d1-a374-c5d2218596f9" providerId="ADAL" clId="{4183866A-C8FF-41BE-9C12-512EFF0AA624}" dt="2020-08-06T14:35:08.967" v="2042" actId="22"/>
-          <ac:picMkLst>
-            <pc:docMk/>
-            <pc:sldMk cId="3617648204" sldId="602"/>
-            <ac:picMk id="4" creationId="{6EDD3A71-6BE4-43D4-A41E-222E5FC78FB7}"/>
-          </ac:picMkLst>
-        </pc:picChg>
-        <pc:picChg chg="add del">
-          <ac:chgData name="Brian" userId="a446eaa4-2b2b-40d1-a374-c5d2218596f9" providerId="ADAL" clId="{4183866A-C8FF-41BE-9C12-512EFF0AA624}" dt="2020-08-06T14:35:13.733" v="2044" actId="478"/>
-          <ac:picMkLst>
-            <pc:docMk/>
-            <pc:sldMk cId="3617648204" sldId="602"/>
-            <ac:picMk id="7" creationId="{A20B6EB2-6000-46C1-904B-EF91746652EA}"/>
-          </ac:picMkLst>
-        </pc:picChg>
-      </pc:sldChg>
-      <pc:sldChg chg="modSp del mod">
-        <pc:chgData name="Brian" userId="a446eaa4-2b2b-40d1-a374-c5d2218596f9" providerId="ADAL" clId="{4183866A-C8FF-41BE-9C12-512EFF0AA624}" dt="2020-08-07T03:40:50.455" v="2889" actId="47"/>
-        <pc:sldMkLst>
-          <pc:docMk/>
-          <pc:sldMk cId="1507660293" sldId="603"/>
-        </pc:sldMkLst>
-        <pc:spChg chg="mod">
-          <ac:chgData name="Brian" userId="a446eaa4-2b2b-40d1-a374-c5d2218596f9" providerId="ADAL" clId="{4183866A-C8FF-41BE-9C12-512EFF0AA624}" dt="2020-08-05T01:50:13.208" v="33" actId="27636"/>
-          <ac:spMkLst>
-            <pc:docMk/>
-            <pc:sldMk cId="1507660293" sldId="603"/>
-            <ac:spMk id="2" creationId="{347BC2CA-3CCA-4704-BAB4-82F3517B63FD}"/>
-          </ac:spMkLst>
-        </pc:spChg>
-        <pc:spChg chg="mod">
-          <ac:chgData name="Brian" userId="a446eaa4-2b2b-40d1-a374-c5d2218596f9" providerId="ADAL" clId="{4183866A-C8FF-41BE-9C12-512EFF0AA624}" dt="2020-08-07T03:38:35.777" v="2833" actId="20577"/>
-          <ac:spMkLst>
-            <pc:docMk/>
-            <pc:sldMk cId="1507660293" sldId="603"/>
-            <ac:spMk id="8" creationId="{04984240-606D-4298-B612-2249915719CE}"/>
-          </ac:spMkLst>
-        </pc:spChg>
-      </pc:sldChg>
-      <pc:sldChg chg="del">
-        <pc:chgData name="Brian" userId="a446eaa4-2b2b-40d1-a374-c5d2218596f9" providerId="ADAL" clId="{4183866A-C8FF-41BE-9C12-512EFF0AA624}" dt="2020-08-07T02:27:56.556" v="2063" actId="47"/>
-        <pc:sldMkLst>
-          <pc:docMk/>
-          <pc:sldMk cId="1036356753" sldId="606"/>
-        </pc:sldMkLst>
-      </pc:sldChg>
-      <pc:sldChg chg="modSp mod ord">
-        <pc:chgData name="Brian" userId="a446eaa4-2b2b-40d1-a374-c5d2218596f9" providerId="ADAL" clId="{4183866A-C8FF-41BE-9C12-512EFF0AA624}" dt="2020-08-07T13:34:48.217" v="5978"/>
-        <pc:sldMkLst>
-          <pc:docMk/>
-          <pc:sldMk cId="613388980" sldId="612"/>
-        </pc:sldMkLst>
-        <pc:spChg chg="mod">
-          <ac:chgData name="Brian" userId="a446eaa4-2b2b-40d1-a374-c5d2218596f9" providerId="ADAL" clId="{4183866A-C8FF-41BE-9C12-512EFF0AA624}" dt="2020-08-05T13:57:13.579" v="1601" actId="20577"/>
-          <ac:spMkLst>
-            <pc:docMk/>
-            <pc:sldMk cId="613388980" sldId="612"/>
-            <ac:spMk id="2" creationId="{347BC2CA-3CCA-4704-BAB4-82F3517B63FD}"/>
-          </ac:spMkLst>
-        </pc:spChg>
-        <pc:spChg chg="mod">
-          <ac:chgData name="Brian" userId="a446eaa4-2b2b-40d1-a374-c5d2218596f9" providerId="ADAL" clId="{4183866A-C8FF-41BE-9C12-512EFF0AA624}" dt="2020-08-06T14:28:23.791" v="2040" actId="20577"/>
-          <ac:spMkLst>
-            <pc:docMk/>
-            <pc:sldMk cId="613388980" sldId="612"/>
-            <ac:spMk id="8" creationId="{04984240-606D-4298-B612-2249915719CE}"/>
-          </ac:spMkLst>
-        </pc:spChg>
-      </pc:sldChg>
-      <pc:sldChg chg="del">
-        <pc:chgData name="Brian" userId="a446eaa4-2b2b-40d1-a374-c5d2218596f9" providerId="ADAL" clId="{4183866A-C8FF-41BE-9C12-512EFF0AA624}" dt="2020-08-05T01:19:47.259" v="31" actId="47"/>
-        <pc:sldMkLst>
-          <pc:docMk/>
-          <pc:sldMk cId="2224488660" sldId="613"/>
-        </pc:sldMkLst>
-      </pc:sldChg>
-      <pc:sldChg chg="addSp delSp modSp add del mod modAnim">
-        <pc:chgData name="Brian" userId="a446eaa4-2b2b-40d1-a374-c5d2218596f9" providerId="ADAL" clId="{4183866A-C8FF-41BE-9C12-512EFF0AA624}" dt="2020-08-07T13:36:33.533" v="5983" actId="14100"/>
-        <pc:sldMkLst>
-          <pc:docMk/>
-          <pc:sldMk cId="3257844464" sldId="614"/>
-        </pc:sldMkLst>
-        <pc:spChg chg="mod">
-          <ac:chgData name="Brian" userId="a446eaa4-2b2b-40d1-a374-c5d2218596f9" providerId="ADAL" clId="{4183866A-C8FF-41BE-9C12-512EFF0AA624}" dt="2020-08-05T02:40:23.830" v="415" actId="14100"/>
-          <ac:spMkLst>
-            <pc:docMk/>
-            <pc:sldMk cId="3257844464" sldId="614"/>
-            <ac:spMk id="2" creationId="{347BC2CA-3CCA-4704-BAB4-82F3517B63FD}"/>
-          </ac:spMkLst>
-        </pc:spChg>
-        <pc:spChg chg="add mod">
-          <ac:chgData name="Brian" userId="a446eaa4-2b2b-40d1-a374-c5d2218596f9" providerId="ADAL" clId="{4183866A-C8FF-41BE-9C12-512EFF0AA624}" dt="2020-08-07T13:36:33.533" v="5983" actId="14100"/>
-          <ac:spMkLst>
-            <pc:docMk/>
-            <pc:sldMk cId="3257844464" sldId="614"/>
-            <ac:spMk id="7" creationId="{23D8E855-7EE4-441C-91F4-6B2351CA987A}"/>
-          </ac:spMkLst>
-        </pc:spChg>
-        <pc:spChg chg="mod">
-          <ac:chgData name="Brian" userId="a446eaa4-2b2b-40d1-a374-c5d2218596f9" providerId="ADAL" clId="{4183866A-C8FF-41BE-9C12-512EFF0AA624}" dt="2020-08-07T03:40:42.151" v="2888" actId="20578"/>
-          <ac:spMkLst>
-            <pc:docMk/>
-            <pc:sldMk cId="3257844464" sldId="614"/>
-            <ac:spMk id="8" creationId="{04984240-606D-4298-B612-2249915719CE}"/>
-          </ac:spMkLst>
-        </pc:spChg>
-        <pc:spChg chg="add mod">
-          <ac:chgData name="Brian" userId="a446eaa4-2b2b-40d1-a374-c5d2218596f9" providerId="ADAL" clId="{4183866A-C8FF-41BE-9C12-512EFF0AA624}" dt="2020-08-07T03:40:09.487" v="2887" actId="27636"/>
-          <ac:spMkLst>
-            <pc:docMk/>
-            <pc:sldMk cId="3257844464" sldId="614"/>
-            <ac:spMk id="10" creationId="{09237115-A802-4EFE-8075-B439CC81C4C5}"/>
-          </ac:spMkLst>
-        </pc:spChg>
-        <pc:picChg chg="add del mod ord">
-          <ac:chgData name="Brian" userId="a446eaa4-2b2b-40d1-a374-c5d2218596f9" providerId="ADAL" clId="{4183866A-C8FF-41BE-9C12-512EFF0AA624}" dt="2020-08-06T14:11:14.951" v="1757" actId="478"/>
-          <ac:picMkLst>
-            <pc:docMk/>
-            <pc:sldMk cId="3257844464" sldId="614"/>
-            <ac:picMk id="4" creationId="{4711AF0B-3B4D-4429-982E-C2ABDBA21849}"/>
-          </ac:picMkLst>
-        </pc:picChg>
-        <pc:picChg chg="del">
-          <ac:chgData name="Brian" userId="a446eaa4-2b2b-40d1-a374-c5d2218596f9" providerId="ADAL" clId="{4183866A-C8FF-41BE-9C12-512EFF0AA624}" dt="2020-08-05T02:53:28.110" v="983" actId="478"/>
-          <ac:picMkLst>
-            <pc:docMk/>
-            <pc:sldMk cId="3257844464" sldId="614"/>
-            <ac:picMk id="6" creationId="{CB49778C-19C2-4A08-B5C1-43CE6E682564}"/>
-          </ac:picMkLst>
-        </pc:picChg>
-        <pc:picChg chg="add mod ord">
-          <ac:chgData name="Brian" userId="a446eaa4-2b2b-40d1-a374-c5d2218596f9" providerId="ADAL" clId="{4183866A-C8FF-41BE-9C12-512EFF0AA624}" dt="2020-08-06T14:11:11.207" v="1756" actId="1038"/>
-          <ac:picMkLst>
-            <pc:docMk/>
-            <pc:sldMk cId="3257844464" sldId="614"/>
-            <ac:picMk id="6" creationId="{F11D1B5C-DA6A-4B54-A5D6-90490D711B66}"/>
-          </ac:picMkLst>
-        </pc:picChg>
-        <pc:picChg chg="del mod">
-          <ac:chgData name="Brian" userId="a446eaa4-2b2b-40d1-a374-c5d2218596f9" providerId="ADAL" clId="{4183866A-C8FF-41BE-9C12-512EFF0AA624}" dt="2020-08-05T02:31:38.857" v="73" actId="478"/>
-          <ac:picMkLst>
-            <pc:docMk/>
-            <pc:sldMk cId="3257844464" sldId="614"/>
-            <ac:picMk id="12" creationId="{3A194D46-1F1A-489C-A2B5-47DA4A8FA0DB}"/>
-          </ac:picMkLst>
-        </pc:picChg>
-      </pc:sldChg>
-      <pc:sldChg chg="addSp delSp modSp mod ord delAnim modAnim">
-        <pc:chgData name="Brian" userId="a446eaa4-2b2b-40d1-a374-c5d2218596f9" providerId="ADAL" clId="{4183866A-C8FF-41BE-9C12-512EFF0AA624}" dt="2020-08-07T13:36:07.677" v="5982"/>
-        <pc:sldMkLst>
-          <pc:docMk/>
-          <pc:sldMk cId="2844177406" sldId="615"/>
-        </pc:sldMkLst>
-        <pc:spChg chg="ord">
-          <ac:chgData name="Brian" userId="a446eaa4-2b2b-40d1-a374-c5d2218596f9" providerId="ADAL" clId="{4183866A-C8FF-41BE-9C12-512EFF0AA624}" dt="2020-08-07T03:06:04.450" v="2215" actId="166"/>
-          <ac:spMkLst>
-            <pc:docMk/>
-            <pc:sldMk cId="2844177406" sldId="615"/>
-            <ac:spMk id="7" creationId="{7C9D716E-415A-4958-8804-59F6527BC224}"/>
-          </ac:spMkLst>
-        </pc:spChg>
-        <pc:spChg chg="mod">
-          <ac:chgData name="Brian" userId="a446eaa4-2b2b-40d1-a374-c5d2218596f9" providerId="ADAL" clId="{4183866A-C8FF-41BE-9C12-512EFF0AA624}" dt="2020-08-05T03:00:06.313" v="1577" actId="108"/>
-          <ac:spMkLst>
-            <pc:docMk/>
-            <pc:sldMk cId="2844177406" sldId="615"/>
-            <ac:spMk id="8" creationId="{04984240-606D-4298-B612-2249915719CE}"/>
-          </ac:spMkLst>
-        </pc:spChg>
-        <pc:spChg chg="add mod ord">
-          <ac:chgData name="Brian" userId="a446eaa4-2b2b-40d1-a374-c5d2218596f9" providerId="ADAL" clId="{4183866A-C8FF-41BE-9C12-512EFF0AA624}" dt="2020-08-07T03:06:04.450" v="2215" actId="166"/>
-          <ac:spMkLst>
-            <pc:docMk/>
-            <pc:sldMk cId="2844177406" sldId="615"/>
-            <ac:spMk id="13" creationId="{2577FBD9-47F8-4381-B174-F1EBDE809DD2}"/>
-          </ac:spMkLst>
-        </pc:spChg>
-        <pc:picChg chg="add mod ord">
-          <ac:chgData name="Brian" userId="a446eaa4-2b2b-40d1-a374-c5d2218596f9" providerId="ADAL" clId="{4183866A-C8FF-41BE-9C12-512EFF0AA624}" dt="2020-08-06T14:12:01.448" v="1861" actId="1037"/>
-          <ac:picMkLst>
-            <pc:docMk/>
-            <pc:sldMk cId="2844177406" sldId="615"/>
-            <ac:picMk id="4" creationId="{12F1BC68-318D-42BA-A5F1-47CB60BD8274}"/>
-          </ac:picMkLst>
-        </pc:picChg>
-        <pc:picChg chg="del">
-          <ac:chgData name="Brian" userId="a446eaa4-2b2b-40d1-a374-c5d2218596f9" providerId="ADAL" clId="{4183866A-C8FF-41BE-9C12-512EFF0AA624}" dt="2020-08-05T02:56:50.840" v="1235" actId="478"/>
-          <ac:picMkLst>
-            <pc:docMk/>
-            <pc:sldMk cId="2844177406" sldId="615"/>
-            <ac:picMk id="4" creationId="{EC4BF7D3-1A15-412C-94B0-8A8394DDE723}"/>
-          </ac:picMkLst>
-        </pc:picChg>
-        <pc:picChg chg="del">
-          <ac:chgData name="Brian" userId="a446eaa4-2b2b-40d1-a374-c5d2218596f9" providerId="ADAL" clId="{4183866A-C8FF-41BE-9C12-512EFF0AA624}" dt="2020-08-05T02:52:34.862" v="842" actId="478"/>
-          <ac:picMkLst>
-            <pc:docMk/>
-            <pc:sldMk cId="2844177406" sldId="615"/>
-            <ac:picMk id="6" creationId="{CB49778C-19C2-4A08-B5C1-43CE6E682564}"/>
-          </ac:picMkLst>
-        </pc:picChg>
-        <pc:picChg chg="add del mod ord">
-          <ac:chgData name="Brian" userId="a446eaa4-2b2b-40d1-a374-c5d2218596f9" providerId="ADAL" clId="{4183866A-C8FF-41BE-9C12-512EFF0AA624}" dt="2020-08-06T14:09:52.056" v="1639" actId="478"/>
-          <ac:picMkLst>
-            <pc:docMk/>
-            <pc:sldMk cId="2844177406" sldId="615"/>
-            <ac:picMk id="9" creationId="{7468D557-D96A-47D6-B167-A6887E8C7A94}"/>
-          </ac:picMkLst>
-        </pc:picChg>
-        <pc:picChg chg="add mod">
-          <ac:chgData name="Brian" userId="a446eaa4-2b2b-40d1-a374-c5d2218596f9" providerId="ADAL" clId="{4183866A-C8FF-41BE-9C12-512EFF0AA624}" dt="2020-08-07T03:05:50.881" v="2213" actId="1038"/>
-          <ac:picMkLst>
-            <pc:docMk/>
-            <pc:sldMk cId="2844177406" sldId="615"/>
-            <ac:picMk id="10" creationId="{D139AB1A-CD3E-4956-9292-B34FEE82ABAB}"/>
-          </ac:picMkLst>
-        </pc:picChg>
-        <pc:picChg chg="add del mod ord">
-          <ac:chgData name="Brian" userId="a446eaa4-2b2b-40d1-a374-c5d2218596f9" providerId="ADAL" clId="{4183866A-C8FF-41BE-9C12-512EFF0AA624}" dt="2020-08-07T03:05:55.929" v="2214" actId="478"/>
-          <ac:picMkLst>
-            <pc:docMk/>
-            <pc:sldMk cId="2844177406" sldId="615"/>
-            <ac:picMk id="11" creationId="{10F1322D-9EBA-415F-B155-EF1EDE8E3A9B}"/>
-          </ac:picMkLst>
-        </pc:picChg>
-        <pc:picChg chg="del">
-          <ac:chgData name="Brian" userId="a446eaa4-2b2b-40d1-a374-c5d2218596f9" providerId="ADAL" clId="{4183866A-C8FF-41BE-9C12-512EFF0AA624}" dt="2020-08-05T02:56:22.454" v="1232" actId="478"/>
-          <ac:picMkLst>
-            <pc:docMk/>
-            <pc:sldMk cId="2844177406" sldId="615"/>
-            <ac:picMk id="12" creationId="{3A194D46-1F1A-489C-A2B5-47DA4A8FA0DB}"/>
-          </ac:picMkLst>
-        </pc:picChg>
-      </pc:sldChg>
-      <pc:sldChg chg="addSp delSp modSp mod">
-        <pc:chgData name="Brian" userId="a446eaa4-2b2b-40d1-a374-c5d2218596f9" providerId="ADAL" clId="{4183866A-C8FF-41BE-9C12-512EFF0AA624}" dt="2020-08-05T03:01:34.115" v="1587" actId="1076"/>
-        <pc:sldMkLst>
-          <pc:docMk/>
-          <pc:sldMk cId="320647891" sldId="617"/>
-        </pc:sldMkLst>
-        <pc:picChg chg="add mod">
-          <ac:chgData name="Brian" userId="a446eaa4-2b2b-40d1-a374-c5d2218596f9" providerId="ADAL" clId="{4183866A-C8FF-41BE-9C12-512EFF0AA624}" dt="2020-08-05T03:01:34.115" v="1587" actId="1076"/>
-          <ac:picMkLst>
-            <pc:docMk/>
-            <pc:sldMk cId="320647891" sldId="617"/>
-            <ac:picMk id="3" creationId="{C4895ED0-5264-466B-97B8-31A016DDD392}"/>
-          </ac:picMkLst>
-        </pc:picChg>
-        <pc:picChg chg="del">
-          <ac:chgData name="Brian" userId="a446eaa4-2b2b-40d1-a374-c5d2218596f9" providerId="ADAL" clId="{4183866A-C8FF-41BE-9C12-512EFF0AA624}" dt="2020-08-05T03:01:25.373" v="1584" actId="478"/>
-          <ac:picMkLst>
-            <pc:docMk/>
-            <pc:sldMk cId="320647891" sldId="617"/>
-            <ac:picMk id="4" creationId="{153A16E6-4902-406C-94D0-B8327D38B156}"/>
-          </ac:picMkLst>
-        </pc:picChg>
-      </pc:sldChg>
-      <pc:sldChg chg="addSp delSp modSp mod">
-        <pc:chgData name="Brian" userId="a446eaa4-2b2b-40d1-a374-c5d2218596f9" providerId="ADAL" clId="{4183866A-C8FF-41BE-9C12-512EFF0AA624}" dt="2020-08-07T03:22:10.247" v="2226" actId="14100"/>
-        <pc:sldMkLst>
-          <pc:docMk/>
-          <pc:sldMk cId="1016200983" sldId="619"/>
-        </pc:sldMkLst>
-        <pc:spChg chg="mod">
-          <ac:chgData name="Brian" userId="a446eaa4-2b2b-40d1-a374-c5d2218596f9" providerId="ADAL" clId="{4183866A-C8FF-41BE-9C12-512EFF0AA624}" dt="2020-08-07T03:22:10.247" v="2226" actId="14100"/>
-          <ac:spMkLst>
-            <pc:docMk/>
-            <pc:sldMk cId="1016200983" sldId="619"/>
-            <ac:spMk id="2" creationId="{347BC2CA-3CCA-4704-BAB4-82F3517B63FD}"/>
-          </ac:spMkLst>
-        </pc:spChg>
-        <pc:spChg chg="add mod">
-          <ac:chgData name="Brian" userId="a446eaa4-2b2b-40d1-a374-c5d2218596f9" providerId="ADAL" clId="{4183866A-C8FF-41BE-9C12-512EFF0AA624}" dt="2020-08-06T14:14:28.614" v="1874" actId="17032"/>
-          <ac:spMkLst>
-            <pc:docMk/>
-            <pc:sldMk cId="1016200983" sldId="619"/>
-            <ac:spMk id="9" creationId="{25B68BA4-1BC1-49EE-9A52-D1FE7279C818}"/>
-          </ac:spMkLst>
-        </pc:spChg>
-        <pc:picChg chg="add del">
-          <ac:chgData name="Brian" userId="a446eaa4-2b2b-40d1-a374-c5d2218596f9" providerId="ADAL" clId="{4183866A-C8FF-41BE-9C12-512EFF0AA624}" dt="2020-08-05T03:01:07.430" v="1582" actId="22"/>
-          <ac:picMkLst>
-            <pc:docMk/>
-            <pc:sldMk cId="1016200983" sldId="619"/>
-            <ac:picMk id="3" creationId="{0BDFDDB4-CFF9-4B8B-927F-A85C936B6EFD}"/>
-          </ac:picMkLst>
-        </pc:picChg>
-        <pc:picChg chg="add del">
-          <ac:chgData name="Brian" userId="a446eaa4-2b2b-40d1-a374-c5d2218596f9" providerId="ADAL" clId="{4183866A-C8FF-41BE-9C12-512EFF0AA624}" dt="2020-08-05T03:01:19.855" v="1583" actId="478"/>
-          <ac:picMkLst>
-            <pc:docMk/>
-            <pc:sldMk cId="1016200983" sldId="619"/>
-            <ac:picMk id="4" creationId="{153A16E6-4902-406C-94D0-B8327D38B156}"/>
-          </ac:picMkLst>
-        </pc:picChg>
-        <pc:picChg chg="add mod">
-          <ac:chgData name="Brian" userId="a446eaa4-2b2b-40d1-a374-c5d2218596f9" providerId="ADAL" clId="{4183866A-C8FF-41BE-9C12-512EFF0AA624}" dt="2020-08-06T14:12:48.291" v="1865" actId="1076"/>
-          <ac:picMkLst>
-            <pc:docMk/>
-            <pc:sldMk cId="1016200983" sldId="619"/>
-            <ac:picMk id="6" creationId="{21EF7F7E-08A7-481B-AE4E-FB51CFF06E31}"/>
-          </ac:picMkLst>
-        </pc:picChg>
-        <pc:picChg chg="add del mod">
-          <ac:chgData name="Brian" userId="a446eaa4-2b2b-40d1-a374-c5d2218596f9" providerId="ADAL" clId="{4183866A-C8FF-41BE-9C12-512EFF0AA624}" dt="2020-08-07T03:21:42.089" v="2216" actId="478"/>
-          <ac:picMkLst>
-            <pc:docMk/>
-            <pc:sldMk cId="1016200983" sldId="619"/>
-            <ac:picMk id="8" creationId="{E2932BF5-E288-4120-A278-4268C3596F74}"/>
-          </ac:picMkLst>
-        </pc:picChg>
-        <pc:picChg chg="add mod">
-          <ac:chgData name="Brian" userId="a446eaa4-2b2b-40d1-a374-c5d2218596f9" providerId="ADAL" clId="{4183866A-C8FF-41BE-9C12-512EFF0AA624}" dt="2020-08-07T03:21:51.634" v="2219" actId="1076"/>
-          <ac:picMkLst>
-            <pc:docMk/>
-            <pc:sldMk cId="1016200983" sldId="619"/>
-            <ac:picMk id="11" creationId="{477251A9-8A8E-48A0-B5DF-A14DB6EA25E6}"/>
-          </ac:picMkLst>
-        </pc:picChg>
-        <pc:picChg chg="del">
-          <ac:chgData name="Brian" userId="a446eaa4-2b2b-40d1-a374-c5d2218596f9" providerId="ADAL" clId="{4183866A-C8FF-41BE-9C12-512EFF0AA624}" dt="2020-08-06T14:12:32.783" v="1862" actId="478"/>
-          <ac:picMkLst>
-            <pc:docMk/>
-            <pc:sldMk cId="1016200983" sldId="619"/>
-            <ac:picMk id="14" creationId="{B86D5392-A625-4EDA-BF8C-0BF88E9BFF9B}"/>
-          </ac:picMkLst>
-        </pc:picChg>
-      </pc:sldChg>
-      <pc:sldChg chg="addSp delSp modSp add mod modAnim">
-        <pc:chgData name="Brian" userId="a446eaa4-2b2b-40d1-a374-c5d2218596f9" providerId="ADAL" clId="{4183866A-C8FF-41BE-9C12-512EFF0AA624}" dt="2020-08-07T13:22:51.415" v="5179" actId="478"/>
-        <pc:sldMkLst>
-          <pc:docMk/>
-          <pc:sldMk cId="3502737837" sldId="620"/>
-        </pc:sldMkLst>
-        <pc:spChg chg="mod">
-          <ac:chgData name="Brian" userId="a446eaa4-2b2b-40d1-a374-c5d2218596f9" providerId="ADAL" clId="{4183866A-C8FF-41BE-9C12-512EFF0AA624}" dt="2020-08-05T02:40:42.659" v="440" actId="14100"/>
-          <ac:spMkLst>
-            <pc:docMk/>
-            <pc:sldMk cId="3502737837" sldId="620"/>
-            <ac:spMk id="2" creationId="{347BC2CA-3CCA-4704-BAB4-82F3517B63FD}"/>
-          </ac:spMkLst>
-        </pc:spChg>
-        <pc:spChg chg="mod">
-          <ac:chgData name="Brian" userId="a446eaa4-2b2b-40d1-a374-c5d2218596f9" providerId="ADAL" clId="{4183866A-C8FF-41BE-9C12-512EFF0AA624}" dt="2020-08-05T02:41:30.663" v="459" actId="1037"/>
-          <ac:spMkLst>
-            <pc:docMk/>
-            <pc:sldMk cId="3502737837" sldId="620"/>
-            <ac:spMk id="7" creationId="{23D8E855-7EE4-441C-91F4-6B2351CA987A}"/>
-          </ac:spMkLst>
-        </pc:spChg>
-        <pc:spChg chg="mod">
-          <ac:chgData name="Brian" userId="a446eaa4-2b2b-40d1-a374-c5d2218596f9" providerId="ADAL" clId="{4183866A-C8FF-41BE-9C12-512EFF0AA624}" dt="2020-08-05T02:46:18.056" v="667" actId="20577"/>
-          <ac:spMkLst>
-            <pc:docMk/>
-            <pc:sldMk cId="3502737837" sldId="620"/>
-            <ac:spMk id="8" creationId="{04984240-606D-4298-B612-2249915719CE}"/>
-          </ac:spMkLst>
-        </pc:spChg>
-        <pc:spChg chg="add mod ord">
-          <ac:chgData name="Brian" userId="a446eaa4-2b2b-40d1-a374-c5d2218596f9" providerId="ADAL" clId="{4183866A-C8FF-41BE-9C12-512EFF0AA624}" dt="2020-08-05T02:56:03.874" v="1231" actId="166"/>
-          <ac:spMkLst>
-            <pc:docMk/>
-            <pc:sldMk cId="3502737837" sldId="620"/>
-            <ac:spMk id="9" creationId="{4E5C3926-2700-4A42-96B4-B863FA3A2079}"/>
-          </ac:spMkLst>
-        </pc:spChg>
-        <pc:picChg chg="add del mod ord">
-          <ac:chgData name="Brian" userId="a446eaa4-2b2b-40d1-a374-c5d2218596f9" providerId="ADAL" clId="{4183866A-C8FF-41BE-9C12-512EFF0AA624}" dt="2020-08-06T14:11:40.864" v="1856" actId="478"/>
-          <ac:picMkLst>
-            <pc:docMk/>
-            <pc:sldMk cId="3502737837" sldId="620"/>
-            <ac:picMk id="4" creationId="{A606B12F-1004-468A-809C-38D78584A7BA}"/>
-          </ac:picMkLst>
-        </pc:picChg>
-        <pc:picChg chg="add del mod">
-          <ac:chgData name="Brian" userId="a446eaa4-2b2b-40d1-a374-c5d2218596f9" providerId="ADAL" clId="{4183866A-C8FF-41BE-9C12-512EFF0AA624}" dt="2020-08-07T13:22:50.462" v="5177" actId="22"/>
-          <ac:picMkLst>
-            <pc:docMk/>
-            <pc:sldMk cId="3502737837" sldId="620"/>
-            <ac:picMk id="4" creationId="{D986129A-7426-44D8-8F3B-E80045FBC6FC}"/>
-          </ac:picMkLst>
-        </pc:picChg>
-        <pc:picChg chg="del mod">
-          <ac:chgData name="Brian" userId="a446eaa4-2b2b-40d1-a374-c5d2218596f9" providerId="ADAL" clId="{4183866A-C8FF-41BE-9C12-512EFF0AA624}" dt="2020-08-05T02:53:05.311" v="894" actId="478"/>
-          <ac:picMkLst>
-            <pc:docMk/>
-            <pc:sldMk cId="3502737837" sldId="620"/>
-            <ac:picMk id="6" creationId="{CB49778C-19C2-4A08-B5C1-43CE6E682564}"/>
-          </ac:picMkLst>
-        </pc:picChg>
-        <pc:picChg chg="add del mod ord">
-          <ac:chgData name="Brian" userId="a446eaa4-2b2b-40d1-a374-c5d2218596f9" providerId="ADAL" clId="{4183866A-C8FF-41BE-9C12-512EFF0AA624}" dt="2020-08-07T13:22:51.415" v="5179" actId="478"/>
-          <ac:picMkLst>
-            <pc:docMk/>
-            <pc:sldMk cId="3502737837" sldId="620"/>
-            <ac:picMk id="6" creationId="{DE256202-F2FC-436C-8A79-BE80D1324F04}"/>
-          </ac:picMkLst>
-        </pc:picChg>
-        <pc:picChg chg="add del mod">
-          <ac:chgData name="Brian" userId="a446eaa4-2b2b-40d1-a374-c5d2218596f9" providerId="ADAL" clId="{4183866A-C8FF-41BE-9C12-512EFF0AA624}" dt="2020-08-07T13:22:50.919" v="5178" actId="478"/>
-          <ac:picMkLst>
-            <pc:docMk/>
-            <pc:sldMk cId="3502737837" sldId="620"/>
-            <ac:picMk id="11" creationId="{390D1487-EB09-41A8-ADCC-ED08BB611C1B}"/>
-          </ac:picMkLst>
-        </pc:picChg>
-        <pc:picChg chg="del">
-          <ac:chgData name="Brian" userId="a446eaa4-2b2b-40d1-a374-c5d2218596f9" providerId="ADAL" clId="{4183866A-C8FF-41BE-9C12-512EFF0AA624}" dt="2020-08-05T02:55:29.190" v="1103" actId="478"/>
-          <ac:picMkLst>
-            <pc:docMk/>
-            <pc:sldMk cId="3502737837" sldId="620"/>
-            <ac:picMk id="12" creationId="{3A194D46-1F1A-489C-A2B5-47DA4A8FA0DB}"/>
-          </ac:picMkLst>
-        </pc:picChg>
-      </pc:sldChg>
-      <pc:sldChg chg="add del">
-        <pc:chgData name="Brian" userId="a446eaa4-2b2b-40d1-a374-c5d2218596f9" providerId="ADAL" clId="{4183866A-C8FF-41BE-9C12-512EFF0AA624}" dt="2020-08-07T03:23:50.371" v="2244" actId="47"/>
-        <pc:sldMkLst>
-          <pc:docMk/>
-          <pc:sldMk cId="1215159900" sldId="621"/>
-        </pc:sldMkLst>
-      </pc:sldChg>
-      <pc:sldChg chg="add">
-        <pc:chgData name="Brian" userId="a446eaa4-2b2b-40d1-a374-c5d2218596f9" providerId="ADAL" clId="{4183866A-C8FF-41BE-9C12-512EFF0AA624}" dt="2020-08-06T14:35:16.982" v="2045"/>
-        <pc:sldMkLst>
-          <pc:docMk/>
-          <pc:sldMk cId="3131913829" sldId="622"/>
-        </pc:sldMkLst>
-      </pc:sldChg>
-      <pc:sldChg chg="modSp add mod ord">
-        <pc:chgData name="Brian" userId="a446eaa4-2b2b-40d1-a374-c5d2218596f9" providerId="ADAL" clId="{4183866A-C8FF-41BE-9C12-512EFF0AA624}" dt="2020-08-07T13:34:51.304" v="5980"/>
-        <pc:sldMkLst>
-          <pc:docMk/>
-          <pc:sldMk cId="2945373686" sldId="623"/>
-        </pc:sldMkLst>
-        <pc:spChg chg="mod">
-          <ac:chgData name="Brian" userId="a446eaa4-2b2b-40d1-a374-c5d2218596f9" providerId="ADAL" clId="{4183866A-C8FF-41BE-9C12-512EFF0AA624}" dt="2020-08-07T03:25:06.354" v="2253" actId="20577"/>
-          <ac:spMkLst>
-            <pc:docMk/>
-            <pc:sldMk cId="2945373686" sldId="623"/>
-            <ac:spMk id="8" creationId="{04984240-606D-4298-B612-2249915719CE}"/>
-          </ac:spMkLst>
-        </pc:spChg>
-      </pc:sldChg>
-      <pc:sldChg chg="addSp modSp new mod ord">
-        <pc:chgData name="Brian" userId="a446eaa4-2b2b-40d1-a374-c5d2218596f9" providerId="ADAL" clId="{4183866A-C8FF-41BE-9C12-512EFF0AA624}" dt="2020-08-07T13:32:46.029" v="5976" actId="27636"/>
-        <pc:sldMkLst>
-          <pc:docMk/>
-          <pc:sldMk cId="1250943863" sldId="624"/>
-        </pc:sldMkLst>
-        <pc:spChg chg="mod">
-          <ac:chgData name="Brian" userId="a446eaa4-2b2b-40d1-a374-c5d2218596f9" providerId="ADAL" clId="{4183866A-C8FF-41BE-9C12-512EFF0AA624}" dt="2020-08-07T13:25:07.126" v="5386" actId="6549"/>
-          <ac:spMkLst>
-            <pc:docMk/>
-            <pc:sldMk cId="1250943863" sldId="624"/>
-            <ac:spMk id="3" creationId="{03AAC4BB-5137-479D-A96E-73E133772375}"/>
-          </ac:spMkLst>
-        </pc:spChg>
-        <pc:spChg chg="mod">
-          <ac:chgData name="Brian" userId="a446eaa4-2b2b-40d1-a374-c5d2218596f9" providerId="ADAL" clId="{4183866A-C8FF-41BE-9C12-512EFF0AA624}" dt="2020-08-07T13:32:46.029" v="5976" actId="27636"/>
-          <ac:spMkLst>
-            <pc:docMk/>
-            <pc:sldMk cId="1250943863" sldId="624"/>
-            <ac:spMk id="4" creationId="{1AA78584-F4E2-4EAD-9928-6CB105C6D405}"/>
-          </ac:spMkLst>
-        </pc:spChg>
-        <pc:picChg chg="add mod">
-          <ac:chgData name="Brian" userId="a446eaa4-2b2b-40d1-a374-c5d2218596f9" providerId="ADAL" clId="{4183866A-C8FF-41BE-9C12-512EFF0AA624}" dt="2020-08-07T13:32:42.829" v="5974" actId="1038"/>
-          <ac:picMkLst>
-            <pc:docMk/>
-            <pc:sldMk cId="1250943863" sldId="624"/>
-            <ac:picMk id="6" creationId="{6B78737A-5743-458E-B51D-07DA9D5D3CC8}"/>
-          </ac:picMkLst>
-        </pc:picChg>
-      </pc:sldChg>
-      <pc:sldChg chg="add del">
-        <pc:chgData name="Brian" userId="a446eaa4-2b2b-40d1-a374-c5d2218596f9" providerId="ADAL" clId="{4183866A-C8FF-41BE-9C12-512EFF0AA624}" dt="2020-08-07T03:24:16.762" v="2248" actId="47"/>
-        <pc:sldMkLst>
-          <pc:docMk/>
-          <pc:sldMk cId="3663410834" sldId="624"/>
-        </pc:sldMkLst>
-      </pc:sldChg>
-      <pc:sldChg chg="addSp modSp add mod">
-        <pc:chgData name="Brian" userId="a446eaa4-2b2b-40d1-a374-c5d2218596f9" providerId="ADAL" clId="{4183866A-C8FF-41BE-9C12-512EFF0AA624}" dt="2020-08-07T13:31:45.894" v="5944" actId="20577"/>
-        <pc:sldMkLst>
-          <pc:docMk/>
-          <pc:sldMk cId="3663906968" sldId="625"/>
-        </pc:sldMkLst>
-        <pc:spChg chg="mod">
-          <ac:chgData name="Brian" userId="a446eaa4-2b2b-40d1-a374-c5d2218596f9" providerId="ADAL" clId="{4183866A-C8FF-41BE-9C12-512EFF0AA624}" dt="2020-08-07T13:27:12.533" v="5590" actId="1037"/>
-          <ac:spMkLst>
-            <pc:docMk/>
-            <pc:sldMk cId="3663906968" sldId="625"/>
-            <ac:spMk id="3" creationId="{03AAC4BB-5137-479D-A96E-73E133772375}"/>
-          </ac:spMkLst>
-        </pc:spChg>
-        <pc:spChg chg="mod">
-          <ac:chgData name="Brian" userId="a446eaa4-2b2b-40d1-a374-c5d2218596f9" providerId="ADAL" clId="{4183866A-C8FF-41BE-9C12-512EFF0AA624}" dt="2020-08-07T13:31:45.894" v="5944" actId="20577"/>
-          <ac:spMkLst>
-            <pc:docMk/>
-            <pc:sldMk cId="3663906968" sldId="625"/>
-            <ac:spMk id="4" creationId="{1AA78584-F4E2-4EAD-9928-6CB105C6D405}"/>
-          </ac:spMkLst>
-        </pc:spChg>
-        <pc:picChg chg="add mod">
-          <ac:chgData name="Brian" userId="a446eaa4-2b2b-40d1-a374-c5d2218596f9" providerId="ADAL" clId="{4183866A-C8FF-41BE-9C12-512EFF0AA624}" dt="2020-08-07T13:27:07.901" v="5568" actId="1038"/>
-          <ac:picMkLst>
-            <pc:docMk/>
-            <pc:sldMk cId="3663906968" sldId="625"/>
-            <ac:picMk id="6" creationId="{11DE863C-B5C6-4878-A745-54FA96F2F4E9}"/>
-          </ac:picMkLst>
-        </pc:picChg>
-      </pc:sldChg>
-      <pc:sldChg chg="modSp add mod">
-        <pc:chgData name="Brian" userId="a446eaa4-2b2b-40d1-a374-c5d2218596f9" providerId="ADAL" clId="{4183866A-C8FF-41BE-9C12-512EFF0AA624}" dt="2020-08-07T03:59:31.672" v="5003" actId="20577"/>
-        <pc:sldMkLst>
-          <pc:docMk/>
-          <pc:sldMk cId="342215219" sldId="626"/>
-        </pc:sldMkLst>
-        <pc:spChg chg="mod">
-          <ac:chgData name="Brian" userId="a446eaa4-2b2b-40d1-a374-c5d2218596f9" providerId="ADAL" clId="{4183866A-C8FF-41BE-9C12-512EFF0AA624}" dt="2020-08-07T03:50:11.544" v="3575" actId="20577"/>
-          <ac:spMkLst>
-            <pc:docMk/>
-            <pc:sldMk cId="342215219" sldId="626"/>
-            <ac:spMk id="3" creationId="{03AAC4BB-5137-479D-A96E-73E133772375}"/>
-          </ac:spMkLst>
-        </pc:spChg>
-        <pc:spChg chg="mod">
-          <ac:chgData name="Brian" userId="a446eaa4-2b2b-40d1-a374-c5d2218596f9" providerId="ADAL" clId="{4183866A-C8FF-41BE-9C12-512EFF0AA624}" dt="2020-08-07T03:59:31.672" v="5003" actId="20577"/>
-          <ac:spMkLst>
-            <pc:docMk/>
-            <pc:sldMk cId="342215219" sldId="626"/>
-            <ac:spMk id="4" creationId="{1AA78584-F4E2-4EAD-9928-6CB105C6D405}"/>
-          </ac:spMkLst>
-        </pc:spChg>
-      </pc:sldChg>
-      <pc:sldChg chg="addSp delSp modSp new del mod">
-        <pc:chgData name="Brian" userId="a446eaa4-2b2b-40d1-a374-c5d2218596f9" providerId="ADAL" clId="{4183866A-C8FF-41BE-9C12-512EFF0AA624}" dt="2020-08-07T13:26:09.329" v="5479" actId="47"/>
-        <pc:sldMkLst>
-          <pc:docMk/>
-          <pc:sldMk cId="1869310926" sldId="627"/>
-        </pc:sldMkLst>
-        <pc:spChg chg="add del mod">
-          <ac:chgData name="Brian" userId="a446eaa4-2b2b-40d1-a374-c5d2218596f9" providerId="ADAL" clId="{4183866A-C8FF-41BE-9C12-512EFF0AA624}" dt="2020-08-07T13:24:24.085" v="5344" actId="14100"/>
-          <ac:spMkLst>
-            <pc:docMk/>
-            <pc:sldMk cId="1869310926" sldId="627"/>
-            <ac:spMk id="3" creationId="{7A61A274-362E-45F8-AD10-0F6865728342}"/>
-          </ac:spMkLst>
-        </pc:spChg>
-        <pc:spChg chg="add del mod">
-          <ac:chgData name="Brian" userId="a446eaa4-2b2b-40d1-a374-c5d2218596f9" providerId="ADAL" clId="{4183866A-C8FF-41BE-9C12-512EFF0AA624}" dt="2020-08-07T13:24:43.253" v="5385" actId="20577"/>
-          <ac:spMkLst>
-            <pc:docMk/>
-            <pc:sldMk cId="1869310926" sldId="627"/>
-            <ac:spMk id="4" creationId="{EE440502-B7BE-4F63-990B-28F1D91DFC8A}"/>
-          </ac:spMkLst>
-        </pc:spChg>
-        <pc:picChg chg="add del mod">
-          <ac:chgData name="Brian" userId="a446eaa4-2b2b-40d1-a374-c5d2218596f9" providerId="ADAL" clId="{4183866A-C8FF-41BE-9C12-512EFF0AA624}" dt="2020-08-07T13:24:03.310" v="5264" actId="22"/>
-          <ac:picMkLst>
-            <pc:docMk/>
-            <pc:sldMk cId="1869310926" sldId="627"/>
-            <ac:picMk id="6" creationId="{34276CA8-9EA3-4AFE-AFC3-D9D347DE553D}"/>
-          </ac:picMkLst>
-        </pc:picChg>
-        <pc:picChg chg="add mod">
-          <ac:chgData name="Brian" userId="a446eaa4-2b2b-40d1-a374-c5d2218596f9" providerId="ADAL" clId="{4183866A-C8FF-41BE-9C12-512EFF0AA624}" dt="2020-08-07T13:24:18.253" v="5343" actId="1038"/>
-          <ac:picMkLst>
-            <pc:docMk/>
-            <pc:sldMk cId="1869310926" sldId="627"/>
-            <ac:picMk id="8" creationId="{9511E101-BCE0-4409-881D-A3F503201A0E}"/>
-          </ac:picMkLst>
-        </pc:picChg>
-      </pc:sldChg>
-    </pc:docChg>
-  </pc:docChgLst>
-  <pc:docChgLst>
-    <pc:chgData name="Brian" userId="a446eaa4-2b2b-40d1-a374-c5d2218596f9" providerId="ADAL" clId="{ABCD562D-4798-4A67-B3BE-E896E1B9131E}"/>
-    <pc:docChg chg="undo redo custSel mod addSld delSld modSld sldOrd modSection">
-      <pc:chgData name="Brian" userId="a446eaa4-2b2b-40d1-a374-c5d2218596f9" providerId="ADAL" clId="{ABCD562D-4798-4A67-B3BE-E896E1B9131E}" dt="2020-07-24T04:18:25.102" v="13586" actId="27636"/>
-      <pc:docMkLst>
-        <pc:docMk/>
-      </pc:docMkLst>
-      <pc:sldChg chg="modSp mod">
-        <pc:chgData name="Brian" userId="a446eaa4-2b2b-40d1-a374-c5d2218596f9" providerId="ADAL" clId="{ABCD562D-4798-4A67-B3BE-E896E1B9131E}" dt="2020-07-22T00:58:41.657" v="23" actId="20577"/>
-        <pc:sldMkLst>
-          <pc:docMk/>
-          <pc:sldMk cId="1238351807" sldId="256"/>
-        </pc:sldMkLst>
-        <pc:spChg chg="mod">
-          <ac:chgData name="Brian" userId="a446eaa4-2b2b-40d1-a374-c5d2218596f9" providerId="ADAL" clId="{ABCD562D-4798-4A67-B3BE-E896E1B9131E}" dt="2020-07-22T00:58:41.657" v="23" actId="20577"/>
-          <ac:spMkLst>
-            <pc:docMk/>
-            <pc:sldMk cId="1238351807" sldId="256"/>
-            <ac:spMk id="2" creationId="{77AAB818-0FA2-4D85-8F6C-25012FAE4659}"/>
-          </ac:spMkLst>
-        </pc:spChg>
-      </pc:sldChg>
-      <pc:sldChg chg="del">
-        <pc:chgData name="Brian" userId="a446eaa4-2b2b-40d1-a374-c5d2218596f9" providerId="ADAL" clId="{ABCD562D-4798-4A67-B3BE-E896E1B9131E}" dt="2020-07-22T01:09:11.004" v="1241" actId="2696"/>
-        <pc:sldMkLst>
-          <pc:docMk/>
-          <pc:sldMk cId="3741355342" sldId="350"/>
-        </pc:sldMkLst>
-      </pc:sldChg>
-      <pc:sldChg chg="del">
-        <pc:chgData name="Brian" userId="a446eaa4-2b2b-40d1-a374-c5d2218596f9" providerId="ADAL" clId="{ABCD562D-4798-4A67-B3BE-E896E1B9131E}" dt="2020-07-22T00:58:51.059" v="24" actId="2696"/>
-        <pc:sldMkLst>
-          <pc:docMk/>
-          <pc:sldMk cId="430594827" sldId="351"/>
-        </pc:sldMkLst>
-      </pc:sldChg>
-      <pc:sldChg chg="delSp del mod">
-        <pc:chgData name="Brian" userId="a446eaa4-2b2b-40d1-a374-c5d2218596f9" providerId="ADAL" clId="{ABCD562D-4798-4A67-B3BE-E896E1B9131E}" dt="2020-07-22T03:48:55.430" v="1245" actId="47"/>
-        <pc:sldMkLst>
-          <pc:docMk/>
-          <pc:sldMk cId="2424860289" sldId="356"/>
-        </pc:sldMkLst>
-        <pc:picChg chg="del">
-          <ac:chgData name="Brian" userId="a446eaa4-2b2b-40d1-a374-c5d2218596f9" providerId="ADAL" clId="{ABCD562D-4798-4A67-B3BE-E896E1B9131E}" dt="2020-07-22T03:47:27.369" v="1242" actId="478"/>
-          <ac:picMkLst>
-            <pc:docMk/>
-            <pc:sldMk cId="2424860289" sldId="356"/>
-            <ac:picMk id="6" creationId="{1BE0FEB3-974C-48D1-9D1F-04046AC3E06E}"/>
-          </ac:picMkLst>
-        </pc:picChg>
-      </pc:sldChg>
-      <pc:sldChg chg="del">
-        <pc:chgData name="Brian" userId="a446eaa4-2b2b-40d1-a374-c5d2218596f9" providerId="ADAL" clId="{ABCD562D-4798-4A67-B3BE-E896E1B9131E}" dt="2020-07-22T03:48:05.577" v="1244" actId="47"/>
-        <pc:sldMkLst>
-          <pc:docMk/>
-          <pc:sldMk cId="802189599" sldId="376"/>
-        </pc:sldMkLst>
-      </pc:sldChg>
-      <pc:sldChg chg="addSp delSp modSp mod setBg">
-        <pc:chgData name="Brian" userId="a446eaa4-2b2b-40d1-a374-c5d2218596f9" providerId="ADAL" clId="{ABCD562D-4798-4A67-B3BE-E896E1B9131E}" dt="2020-07-22T14:02:11.962" v="2657" actId="14100"/>
-        <pc:sldMkLst>
-          <pc:docMk/>
-          <pc:sldMk cId="2491124764" sldId="377"/>
-        </pc:sldMkLst>
-        <pc:spChg chg="mod">
-          <ac:chgData name="Brian" userId="a446eaa4-2b2b-40d1-a374-c5d2218596f9" providerId="ADAL" clId="{ABCD562D-4798-4A67-B3BE-E896E1B9131E}" dt="2020-07-22T13:57:14.247" v="2637" actId="26606"/>
-          <ac:spMkLst>
-            <pc:docMk/>
-            <pc:sldMk cId="2491124764" sldId="377"/>
-            <ac:spMk id="2" creationId="{347BC2CA-3CCA-4704-BAB4-82F3517B63FD}"/>
-          </ac:spMkLst>
-        </pc:spChg>
-        <pc:spChg chg="mod ord">
-          <ac:chgData name="Brian" userId="a446eaa4-2b2b-40d1-a374-c5d2218596f9" providerId="ADAL" clId="{ABCD562D-4798-4A67-B3BE-E896E1B9131E}" dt="2020-07-22T13:57:14.247" v="2637" actId="26606"/>
-          <ac:spMkLst>
-            <pc:docMk/>
-            <pc:sldMk cId="2491124764" sldId="377"/>
-            <ac:spMk id="5" creationId="{ED0B7381-64FF-4013-8C95-D94F0165DF83}"/>
-          </ac:spMkLst>
-        </pc:spChg>
-        <pc:spChg chg="mod">
-          <ac:chgData name="Brian" userId="a446eaa4-2b2b-40d1-a374-c5d2218596f9" providerId="ADAL" clId="{ABCD562D-4798-4A67-B3BE-E896E1B9131E}" dt="2020-07-22T13:59:22.001" v="2653" actId="113"/>
-          <ac:spMkLst>
-            <pc:docMk/>
-            <pc:sldMk cId="2491124764" sldId="377"/>
-            <ac:spMk id="6" creationId="{0C461184-E5D7-45D3-A5D9-9756EE6F702C}"/>
-          </ac:spMkLst>
-        </pc:spChg>
-        <pc:spChg chg="add">
-          <ac:chgData name="Brian" userId="a446eaa4-2b2b-40d1-a374-c5d2218596f9" providerId="ADAL" clId="{ABCD562D-4798-4A67-B3BE-E896E1B9131E}" dt="2020-07-22T13:57:14.247" v="2637" actId="26606"/>
-          <ac:spMkLst>
-            <pc:docMk/>
-            <pc:sldMk cId="2491124764" sldId="377"/>
-            <ac:spMk id="39" creationId="{B8FE8EF1-7AF2-4864-A8DE-7EE3481DA1D4}"/>
-          </ac:spMkLst>
-        </pc:spChg>
-        <pc:spChg chg="add">
-          <ac:chgData name="Brian" userId="a446eaa4-2b2b-40d1-a374-c5d2218596f9" providerId="ADAL" clId="{ABCD562D-4798-4A67-B3BE-E896E1B9131E}" dt="2020-07-22T13:57:14.247" v="2637" actId="26606"/>
-          <ac:spMkLst>
-            <pc:docMk/>
-            <pc:sldMk cId="2491124764" sldId="377"/>
-            <ac:spMk id="41" creationId="{5B3CCFC9-E82D-444E-9621-FE5F95E679EC}"/>
-          </ac:spMkLst>
-        </pc:spChg>
-        <pc:grpChg chg="add">
-          <ac:chgData name="Brian" userId="a446eaa4-2b2b-40d1-a374-c5d2218596f9" providerId="ADAL" clId="{ABCD562D-4798-4A67-B3BE-E896E1B9131E}" dt="2020-07-22T13:57:14.247" v="2637" actId="26606"/>
-          <ac:grpSpMkLst>
-            <pc:docMk/>
-            <pc:sldMk cId="2491124764" sldId="377"/>
-            <ac:grpSpMk id="11" creationId="{7B7EFD05-5F12-420E-8AEF-74D5EF9D58BC}"/>
-          </ac:grpSpMkLst>
-        </pc:grpChg>
-        <pc:grpChg chg="add">
-          <ac:chgData name="Brian" userId="a446eaa4-2b2b-40d1-a374-c5d2218596f9" providerId="ADAL" clId="{ABCD562D-4798-4A67-B3BE-E896E1B9131E}" dt="2020-07-22T13:57:14.247" v="2637" actId="26606"/>
-          <ac:grpSpMkLst>
-            <pc:docMk/>
-            <pc:sldMk cId="2491124764" sldId="377"/>
-            <ac:grpSpMk id="25" creationId="{B64F33C7-E158-4057-87E7-6F42AA6D034A}"/>
-          </ac:grpSpMkLst>
-        </pc:grpChg>
-        <pc:picChg chg="add del mod">
-          <ac:chgData name="Brian" userId="a446eaa4-2b2b-40d1-a374-c5d2218596f9" providerId="ADAL" clId="{ABCD562D-4798-4A67-B3BE-E896E1B9131E}" dt="2020-07-22T14:02:05.424" v="2654" actId="478"/>
-          <ac:picMkLst>
-            <pc:docMk/>
-            <pc:sldMk cId="2491124764" sldId="377"/>
-            <ac:picMk id="4" creationId="{1747FC7A-177E-4AA9-9999-58036A501015}"/>
-          </ac:picMkLst>
-        </pc:picChg>
-        <pc:picChg chg="add mod">
-          <ac:chgData name="Brian" userId="a446eaa4-2b2b-40d1-a374-c5d2218596f9" providerId="ADAL" clId="{ABCD562D-4798-4A67-B3BE-E896E1B9131E}" dt="2020-07-22T14:02:11.962" v="2657" actId="14100"/>
-          <ac:picMkLst>
-            <pc:docMk/>
-            <pc:sldMk cId="2491124764" sldId="377"/>
-            <ac:picMk id="8" creationId="{09AA11B5-85C4-4DB0-8FDD-D02EB404BCD9}"/>
-          </ac:picMkLst>
-        </pc:picChg>
-      </pc:sldChg>
-      <pc:sldChg chg="delSp modSp mod">
-        <pc:chgData name="Brian" userId="a446eaa4-2b2b-40d1-a374-c5d2218596f9" providerId="ADAL" clId="{ABCD562D-4798-4A67-B3BE-E896E1B9131E}" dt="2020-07-22T01:00:00.161" v="121" actId="20577"/>
-        <pc:sldMkLst>
-          <pc:docMk/>
-          <pc:sldMk cId="2264832815" sldId="390"/>
-        </pc:sldMkLst>
-        <pc:spChg chg="mod">
-          <ac:chgData name="Brian" userId="a446eaa4-2b2b-40d1-a374-c5d2218596f9" providerId="ADAL" clId="{ABCD562D-4798-4A67-B3BE-E896E1B9131E}" dt="2020-07-22T00:59:07.642" v="26" actId="14100"/>
-          <ac:spMkLst>
-            <pc:docMk/>
-            <pc:sldMk cId="2264832815" sldId="390"/>
-            <ac:spMk id="7" creationId="{00000000-0000-0000-0000-000000000000}"/>
-          </ac:spMkLst>
-        </pc:spChg>
-        <pc:spChg chg="mod">
-          <ac:chgData name="Brian" userId="a446eaa4-2b2b-40d1-a374-c5d2218596f9" providerId="ADAL" clId="{ABCD562D-4798-4A67-B3BE-E896E1B9131E}" dt="2020-07-22T01:00:00.161" v="121" actId="20577"/>
-          <ac:spMkLst>
-            <pc:docMk/>
-            <pc:sldMk cId="2264832815" sldId="390"/>
-            <ac:spMk id="8" creationId="{31C3177A-8320-4082-A213-0C29EE56AB88}"/>
-          </ac:spMkLst>
-        </pc:spChg>
-        <pc:spChg chg="del">
-          <ac:chgData name="Brian" userId="a446eaa4-2b2b-40d1-a374-c5d2218596f9" providerId="ADAL" clId="{ABCD562D-4798-4A67-B3BE-E896E1B9131E}" dt="2020-07-22T00:59:11.714" v="27" actId="478"/>
-          <ac:spMkLst>
-            <pc:docMk/>
-            <pc:sldMk cId="2264832815" sldId="390"/>
-            <ac:spMk id="9" creationId="{00000000-0000-0000-0000-000000000000}"/>
-          </ac:spMkLst>
-        </pc:spChg>
-      </pc:sldChg>
-      <pc:sldChg chg="del">
-        <pc:chgData name="Brian" userId="a446eaa4-2b2b-40d1-a374-c5d2218596f9" providerId="ADAL" clId="{ABCD562D-4798-4A67-B3BE-E896E1B9131E}" dt="2020-07-22T03:47:32.370" v="1243" actId="47"/>
-        <pc:sldMkLst>
-          <pc:docMk/>
-          <pc:sldMk cId="1857018149" sldId="596"/>
-        </pc:sldMkLst>
-      </pc:sldChg>
-      <pc:sldChg chg="del">
-        <pc:chgData name="Brian" userId="a446eaa4-2b2b-40d1-a374-c5d2218596f9" providerId="ADAL" clId="{ABCD562D-4798-4A67-B3BE-E896E1B9131E}" dt="2020-07-22T03:48:55.430" v="1245" actId="47"/>
-        <pc:sldMkLst>
-          <pc:docMk/>
-          <pc:sldMk cId="1016450660" sldId="597"/>
-        </pc:sldMkLst>
-      </pc:sldChg>
-      <pc:sldChg chg="del">
-        <pc:chgData name="Brian" userId="a446eaa4-2b2b-40d1-a374-c5d2218596f9" providerId="ADAL" clId="{ABCD562D-4798-4A67-B3BE-E896E1B9131E}" dt="2020-07-22T03:48:55.430" v="1245" actId="47"/>
-        <pc:sldMkLst>
-          <pc:docMk/>
-          <pc:sldMk cId="2869412446" sldId="598"/>
-        </pc:sldMkLst>
-      </pc:sldChg>
-      <pc:sldChg chg="del">
-        <pc:chgData name="Brian" userId="a446eaa4-2b2b-40d1-a374-c5d2218596f9" providerId="ADAL" clId="{ABCD562D-4798-4A67-B3BE-E896E1B9131E}" dt="2020-07-22T03:48:55.430" v="1245" actId="47"/>
-        <pc:sldMkLst>
-          <pc:docMk/>
-          <pc:sldMk cId="799062" sldId="599"/>
-        </pc:sldMkLst>
-      </pc:sldChg>
-      <pc:sldChg chg="del">
-        <pc:chgData name="Brian" userId="a446eaa4-2b2b-40d1-a374-c5d2218596f9" providerId="ADAL" clId="{ABCD562D-4798-4A67-B3BE-E896E1B9131E}" dt="2020-07-22T03:48:55.430" v="1245" actId="47"/>
-        <pc:sldMkLst>
-          <pc:docMk/>
-          <pc:sldMk cId="3318435924" sldId="600"/>
-        </pc:sldMkLst>
-      </pc:sldChg>
-      <pc:sldChg chg="addSp delSp modSp del mod">
-        <pc:chgData name="Brian" userId="a446eaa4-2b2b-40d1-a374-c5d2218596f9" providerId="ADAL" clId="{ABCD562D-4798-4A67-B3BE-E896E1B9131E}" dt="2020-07-24T03:36:04.706" v="9227" actId="47"/>
-        <pc:sldMkLst>
-          <pc:docMk/>
-          <pc:sldMk cId="1792065074" sldId="601"/>
-        </pc:sldMkLst>
-        <pc:spChg chg="mod">
-          <ac:chgData name="Brian" userId="a446eaa4-2b2b-40d1-a374-c5d2218596f9" providerId="ADAL" clId="{ABCD562D-4798-4A67-B3BE-E896E1B9131E}" dt="2020-07-22T14:03:26.856" v="2680" actId="1035"/>
-          <ac:spMkLst>
-            <pc:docMk/>
-            <pc:sldMk cId="1792065074" sldId="601"/>
-            <ac:spMk id="2" creationId="{347BC2CA-3CCA-4704-BAB4-82F3517B63FD}"/>
-          </ac:spMkLst>
-        </pc:spChg>
-        <pc:spChg chg="mod">
-          <ac:chgData name="Brian" userId="a446eaa4-2b2b-40d1-a374-c5d2218596f9" providerId="ADAL" clId="{ABCD562D-4798-4A67-B3BE-E896E1B9131E}" dt="2020-07-22T14:03:26.856" v="2680" actId="1035"/>
-          <ac:spMkLst>
-            <pc:docMk/>
-            <pc:sldMk cId="1792065074" sldId="601"/>
-            <ac:spMk id="8" creationId="{04984240-606D-4298-B612-2249915719CE}"/>
-          </ac:spMkLst>
-        </pc:spChg>
-        <pc:spChg chg="add mod">
-          <ac:chgData name="Brian" userId="a446eaa4-2b2b-40d1-a374-c5d2218596f9" providerId="ADAL" clId="{ABCD562D-4798-4A67-B3BE-E896E1B9131E}" dt="2020-07-22T14:06:25.596" v="3068" actId="207"/>
-          <ac:spMkLst>
-            <pc:docMk/>
-            <pc:sldMk cId="1792065074" sldId="601"/>
-            <ac:spMk id="11" creationId="{AD59C099-AB7A-45EE-8138-CDAB97505D56}"/>
-          </ac:spMkLst>
-        </pc:spChg>
-        <pc:graphicFrameChg chg="add del mod modGraphic">
-          <ac:chgData name="Brian" userId="a446eaa4-2b2b-40d1-a374-c5d2218596f9" providerId="ADAL" clId="{ABCD562D-4798-4A67-B3BE-E896E1B9131E}" dt="2020-07-22T13:22:35.981" v="1938" actId="478"/>
-          <ac:graphicFrameMkLst>
-            <pc:docMk/>
-            <pc:sldMk cId="1792065074" sldId="601"/>
-            <ac:graphicFrameMk id="3" creationId="{67A13479-12D3-48DB-974E-BA0C7EBD2D46}"/>
-          </ac:graphicFrameMkLst>
-        </pc:graphicFrameChg>
-        <pc:picChg chg="add mod">
-          <ac:chgData name="Brian" userId="a446eaa4-2b2b-40d1-a374-c5d2218596f9" providerId="ADAL" clId="{ABCD562D-4798-4A67-B3BE-E896E1B9131E}" dt="2020-07-22T14:06:17.169" v="3067" actId="1035"/>
-          <ac:picMkLst>
-            <pc:docMk/>
-            <pc:sldMk cId="1792065074" sldId="601"/>
-            <ac:picMk id="6" creationId="{35A80293-6B21-4B67-8959-0CF27DEA1B59}"/>
-          </ac:picMkLst>
-        </pc:picChg>
-        <pc:picChg chg="add del">
-          <ac:chgData name="Brian" userId="a446eaa4-2b2b-40d1-a374-c5d2218596f9" providerId="ADAL" clId="{ABCD562D-4798-4A67-B3BE-E896E1B9131E}" dt="2020-07-22T14:03:33.745" v="2683" actId="22"/>
-          <ac:picMkLst>
-            <pc:docMk/>
-            <pc:sldMk cId="1792065074" sldId="601"/>
-            <ac:picMk id="9" creationId="{5B24359E-05C2-4088-AEB8-BA6D26175F29}"/>
-          </ac:picMkLst>
-        </pc:picChg>
-        <pc:picChg chg="del">
-          <ac:chgData name="Brian" userId="a446eaa4-2b2b-40d1-a374-c5d2218596f9" providerId="ADAL" clId="{ABCD562D-4798-4A67-B3BE-E896E1B9131E}" dt="2020-07-22T04:08:42.618" v="1246" actId="478"/>
-          <ac:picMkLst>
-            <pc:docMk/>
-            <pc:sldMk cId="1792065074" sldId="601"/>
-            <ac:picMk id="10" creationId="{B22991D6-F0AF-4AEF-9153-958A18DAE302}"/>
-          </ac:picMkLst>
-        </pc:picChg>
-      </pc:sldChg>
-      <pc:sldChg chg="addSp delSp modSp add mod ord">
-        <pc:chgData name="Brian" userId="a446eaa4-2b2b-40d1-a374-c5d2218596f9" providerId="ADAL" clId="{ABCD562D-4798-4A67-B3BE-E896E1B9131E}" dt="2020-07-24T03:39:41.951" v="9324"/>
-        <pc:sldMkLst>
-          <pc:docMk/>
-          <pc:sldMk cId="3617648204" sldId="602"/>
-        </pc:sldMkLst>
-        <pc:spChg chg="mod">
-          <ac:chgData name="Brian" userId="a446eaa4-2b2b-40d1-a374-c5d2218596f9" providerId="ADAL" clId="{ABCD562D-4798-4A67-B3BE-E896E1B9131E}" dt="2020-07-22T04:09:41.498" v="1330" actId="20577"/>
-          <ac:spMkLst>
-            <pc:docMk/>
-            <pc:sldMk cId="3617648204" sldId="602"/>
-            <ac:spMk id="2" creationId="{347BC2CA-3CCA-4704-BAB4-82F3517B63FD}"/>
-          </ac:spMkLst>
-        </pc:spChg>
-        <pc:spChg chg="mod">
-          <ac:chgData name="Brian" userId="a446eaa4-2b2b-40d1-a374-c5d2218596f9" providerId="ADAL" clId="{ABCD562D-4798-4A67-B3BE-E896E1B9131E}" dt="2020-07-23T19:53:44.534" v="4453" actId="20577"/>
-          <ac:spMkLst>
-            <pc:docMk/>
-            <pc:sldMk cId="3617648204" sldId="602"/>
-            <ac:spMk id="8" creationId="{04984240-606D-4298-B612-2249915719CE}"/>
-          </ac:spMkLst>
-        </pc:spChg>
-        <pc:picChg chg="add del mod">
-          <ac:chgData name="Brian" userId="a446eaa4-2b2b-40d1-a374-c5d2218596f9" providerId="ADAL" clId="{ABCD562D-4798-4A67-B3BE-E896E1B9131E}" dt="2020-07-23T19:50:12.895" v="4282" actId="478"/>
-          <ac:picMkLst>
-            <pc:docMk/>
-            <pc:sldMk cId="3617648204" sldId="602"/>
-            <ac:picMk id="4" creationId="{7A337395-CBDE-4D56-A4EF-CEEAC91EF489}"/>
-          </ac:picMkLst>
-        </pc:picChg>
-        <pc:picChg chg="add del mod">
-          <ac:chgData name="Brian" userId="a446eaa4-2b2b-40d1-a374-c5d2218596f9" providerId="ADAL" clId="{ABCD562D-4798-4A67-B3BE-E896E1B9131E}" dt="2020-07-23T19:50:25.118" v="4286" actId="478"/>
-          <ac:picMkLst>
-            <pc:docMk/>
-            <pc:sldMk cId="3617648204" sldId="602"/>
-            <ac:picMk id="6" creationId="{06AE449B-CC3D-4278-BEA5-C813B742AD92}"/>
-          </ac:picMkLst>
-        </pc:picChg>
-        <pc:picChg chg="add mod">
-          <ac:chgData name="Brian" userId="a446eaa4-2b2b-40d1-a374-c5d2218596f9" providerId="ADAL" clId="{ABCD562D-4798-4A67-B3BE-E896E1B9131E}" dt="2020-07-23T19:52:20.743" v="4437" actId="1038"/>
-          <ac:picMkLst>
-            <pc:docMk/>
-            <pc:sldMk cId="3617648204" sldId="602"/>
-            <ac:picMk id="9" creationId="{7FCDFD41-68C3-4758-8D74-E9E55D6FF4E9}"/>
-          </ac:picMkLst>
-        </pc:picChg>
-        <pc:picChg chg="add mod">
-          <ac:chgData name="Brian" userId="a446eaa4-2b2b-40d1-a374-c5d2218596f9" providerId="ADAL" clId="{ABCD562D-4798-4A67-B3BE-E896E1B9131E}" dt="2020-07-23T19:52:17.192" v="4407" actId="1036"/>
-          <ac:picMkLst>
-            <pc:docMk/>
-            <pc:sldMk cId="3617648204" sldId="602"/>
-            <ac:picMk id="11" creationId="{6A669D29-4D0D-412E-9D38-3352204BFD28}"/>
-          </ac:picMkLst>
-        </pc:picChg>
-        <pc:picChg chg="add mod">
-          <ac:chgData name="Brian" userId="a446eaa4-2b2b-40d1-a374-c5d2218596f9" providerId="ADAL" clId="{ABCD562D-4798-4A67-B3BE-E896E1B9131E}" dt="2020-07-23T19:52:10.693" v="4367" actId="1037"/>
-          <ac:picMkLst>
-            <pc:docMk/>
-            <pc:sldMk cId="3617648204" sldId="602"/>
-            <ac:picMk id="13" creationId="{9A6E8B6B-6256-4F92-AA93-D4CA4962F36E}"/>
-          </ac:picMkLst>
-        </pc:picChg>
-      </pc:sldChg>
-      <pc:sldChg chg="addSp delSp modSp add mod ord">
-        <pc:chgData name="Brian" userId="a446eaa4-2b2b-40d1-a374-c5d2218596f9" providerId="ADAL" clId="{ABCD562D-4798-4A67-B3BE-E896E1B9131E}" dt="2020-07-23T21:20:23.492" v="6784" actId="20577"/>
-        <pc:sldMkLst>
-          <pc:docMk/>
-          <pc:sldMk cId="1507660293" sldId="603"/>
-        </pc:sldMkLst>
-        <pc:spChg chg="mod">
-          <ac:chgData name="Brian" userId="a446eaa4-2b2b-40d1-a374-c5d2218596f9" providerId="ADAL" clId="{ABCD562D-4798-4A67-B3BE-E896E1B9131E}" dt="2020-07-23T21:07:30.612" v="5510" actId="20577"/>
-          <ac:spMkLst>
-            <pc:docMk/>
-            <pc:sldMk cId="1507660293" sldId="603"/>
-            <ac:spMk id="2" creationId="{347BC2CA-3CCA-4704-BAB4-82F3517B63FD}"/>
-          </ac:spMkLst>
-        </pc:spChg>
-        <pc:spChg chg="mod">
-          <ac:chgData name="Brian" userId="a446eaa4-2b2b-40d1-a374-c5d2218596f9" providerId="ADAL" clId="{ABCD562D-4798-4A67-B3BE-E896E1B9131E}" dt="2020-07-23T21:20:23.492" v="6784" actId="20577"/>
-          <ac:spMkLst>
-            <pc:docMk/>
-            <pc:sldMk cId="1507660293" sldId="603"/>
-            <ac:spMk id="8" creationId="{04984240-606D-4298-B612-2249915719CE}"/>
-          </ac:spMkLst>
-        </pc:spChg>
-        <pc:picChg chg="add del mod">
-          <ac:chgData name="Brian" userId="a446eaa4-2b2b-40d1-a374-c5d2218596f9" providerId="ADAL" clId="{ABCD562D-4798-4A67-B3BE-E896E1B9131E}" dt="2020-07-23T21:04:21.420" v="5395" actId="478"/>
-          <ac:picMkLst>
-            <pc:docMk/>
-            <pc:sldMk cId="1507660293" sldId="603"/>
-            <ac:picMk id="4" creationId="{ADBAC3D4-6CBD-40FD-889E-AFBFAC1C5FBC}"/>
-          </ac:picMkLst>
-        </pc:picChg>
-        <pc:picChg chg="add del mod">
-          <ac:chgData name="Brian" userId="a446eaa4-2b2b-40d1-a374-c5d2218596f9" providerId="ADAL" clId="{ABCD562D-4798-4A67-B3BE-E896E1B9131E}" dt="2020-07-23T21:06:23.084" v="5400" actId="478"/>
-          <ac:picMkLst>
-            <pc:docMk/>
-            <pc:sldMk cId="1507660293" sldId="603"/>
-            <ac:picMk id="7" creationId="{744C7F58-515D-4723-8CD4-F2DE27061F86}"/>
-          </ac:picMkLst>
-        </pc:picChg>
-      </pc:sldChg>
-      <pc:sldChg chg="add del">
-        <pc:chgData name="Brian" userId="a446eaa4-2b2b-40d1-a374-c5d2218596f9" providerId="ADAL" clId="{ABCD562D-4798-4A67-B3BE-E896E1B9131E}" dt="2020-07-22T14:40:43.587" v="4132" actId="47"/>
-        <pc:sldMkLst>
-          <pc:docMk/>
-          <pc:sldMk cId="2132691113" sldId="604"/>
-        </pc:sldMkLst>
-      </pc:sldChg>
-      <pc:sldChg chg="addSp delSp modSp add mod">
-        <pc:chgData name="Brian" userId="a446eaa4-2b2b-40d1-a374-c5d2218596f9" providerId="ADAL" clId="{ABCD562D-4798-4A67-B3BE-E896E1B9131E}" dt="2020-07-22T14:07:45.195" v="3095" actId="1076"/>
-        <pc:sldMkLst>
-          <pc:docMk/>
-          <pc:sldMk cId="3438907925" sldId="605"/>
-        </pc:sldMkLst>
-        <pc:spChg chg="del">
-          <ac:chgData name="Brian" userId="a446eaa4-2b2b-40d1-a374-c5d2218596f9" providerId="ADAL" clId="{ABCD562D-4798-4A67-B3BE-E896E1B9131E}" dt="2020-07-22T14:07:21.987" v="3087" actId="478"/>
-          <ac:spMkLst>
-            <pc:docMk/>
-            <pc:sldMk cId="3438907925" sldId="605"/>
-            <ac:spMk id="2" creationId="{90A50795-4F77-4858-B1B6-D6E64DE66167}"/>
-          </ac:spMkLst>
-        </pc:spChg>
-        <pc:spChg chg="add del mod">
-          <ac:chgData name="Brian" userId="a446eaa4-2b2b-40d1-a374-c5d2218596f9" providerId="ADAL" clId="{ABCD562D-4798-4A67-B3BE-E896E1B9131E}" dt="2020-07-22T14:07:26.649" v="3088" actId="478"/>
-          <ac:spMkLst>
-            <pc:docMk/>
-            <pc:sldMk cId="3438907925" sldId="605"/>
-            <ac:spMk id="5" creationId="{FF179869-E8E4-44B7-873D-3293F58B2EC9}"/>
-          </ac:spMkLst>
-        </pc:spChg>
-        <pc:spChg chg="mod">
-          <ac:chgData name="Brian" userId="a446eaa4-2b2b-40d1-a374-c5d2218596f9" providerId="ADAL" clId="{ABCD562D-4798-4A67-B3BE-E896E1B9131E}" dt="2020-07-22T14:07:45.195" v="3095" actId="1076"/>
-          <ac:spMkLst>
-            <pc:docMk/>
-            <pc:sldMk cId="3438907925" sldId="605"/>
-            <ac:spMk id="7" creationId="{6152EC9D-6CA0-41EF-8D38-F078AC452365}"/>
-          </ac:spMkLst>
-        </pc:spChg>
-        <pc:spChg chg="add del mod">
-          <ac:chgData name="Brian" userId="a446eaa4-2b2b-40d1-a374-c5d2218596f9" providerId="ADAL" clId="{ABCD562D-4798-4A67-B3BE-E896E1B9131E}" dt="2020-07-22T14:07:33.305" v="3091" actId="478"/>
-          <ac:spMkLst>
-            <pc:docMk/>
-            <pc:sldMk cId="3438907925" sldId="605"/>
-            <ac:spMk id="8" creationId="{EF331D52-E4BA-4D04-8A37-AFA577F0934E}"/>
-          </ac:spMkLst>
-        </pc:spChg>
-        <pc:spChg chg="del mod">
-          <ac:chgData name="Brian" userId="a446eaa4-2b2b-40d1-a374-c5d2218596f9" providerId="ADAL" clId="{ABCD562D-4798-4A67-B3BE-E896E1B9131E}" dt="2020-07-22T14:07:30.971" v="3090" actId="478"/>
-          <ac:spMkLst>
-            <pc:docMk/>
-            <pc:sldMk cId="3438907925" sldId="605"/>
-            <ac:spMk id="19" creationId="{2F89D75D-A85E-42ED-A43F-D127B111AEB1}"/>
-          </ac:spMkLst>
-        </pc:spChg>
-      </pc:sldChg>
-      <pc:sldChg chg="addSp delSp modSp add mod ord">
-        <pc:chgData name="Brian" userId="a446eaa4-2b2b-40d1-a374-c5d2218596f9" providerId="ADAL" clId="{ABCD562D-4798-4A67-B3BE-E896E1B9131E}" dt="2020-07-22T14:17:45.117" v="4100" actId="255"/>
-        <pc:sldMkLst>
-          <pc:docMk/>
-          <pc:sldMk cId="1036356753" sldId="606"/>
-        </pc:sldMkLst>
-        <pc:spChg chg="mod">
-          <ac:chgData name="Brian" userId="a446eaa4-2b2b-40d1-a374-c5d2218596f9" providerId="ADAL" clId="{ABCD562D-4798-4A67-B3BE-E896E1B9131E}" dt="2020-07-22T14:08:17.864" v="3141" actId="404"/>
-          <ac:spMkLst>
-            <pc:docMk/>
-            <pc:sldMk cId="1036356753" sldId="606"/>
-            <ac:spMk id="2" creationId="{347BC2CA-3CCA-4704-BAB4-82F3517B63FD}"/>
-          </ac:spMkLst>
-        </pc:spChg>
-        <pc:spChg chg="mod">
-          <ac:chgData name="Brian" userId="a446eaa4-2b2b-40d1-a374-c5d2218596f9" providerId="ADAL" clId="{ABCD562D-4798-4A67-B3BE-E896E1B9131E}" dt="2020-07-22T14:17:37.363" v="4099" actId="27636"/>
-          <ac:spMkLst>
-            <pc:docMk/>
-            <pc:sldMk cId="1036356753" sldId="606"/>
-            <ac:spMk id="8" creationId="{04984240-606D-4298-B612-2249915719CE}"/>
-          </ac:spMkLst>
-        </pc:spChg>
-        <pc:spChg chg="add mod">
-          <ac:chgData name="Brian" userId="a446eaa4-2b2b-40d1-a374-c5d2218596f9" providerId="ADAL" clId="{ABCD562D-4798-4A67-B3BE-E896E1B9131E}" dt="2020-07-22T14:17:37.343" v="4098" actId="14100"/>
-          <ac:spMkLst>
-            <pc:docMk/>
-            <pc:sldMk cId="1036356753" sldId="606"/>
-            <ac:spMk id="10" creationId="{A5D9055D-3D63-4759-A529-A334B82D8821}"/>
-          </ac:spMkLst>
-        </pc:spChg>
-        <pc:spChg chg="del">
-          <ac:chgData name="Brian" userId="a446eaa4-2b2b-40d1-a374-c5d2218596f9" providerId="ADAL" clId="{ABCD562D-4798-4A67-B3BE-E896E1B9131E}" dt="2020-07-22T14:08:26.681" v="3142" actId="478"/>
-          <ac:spMkLst>
-            <pc:docMk/>
-            <pc:sldMk cId="1036356753" sldId="606"/>
-            <ac:spMk id="11" creationId="{AD59C099-AB7A-45EE-8138-CDAB97505D56}"/>
-          </ac:spMkLst>
-        </pc:spChg>
-        <pc:spChg chg="add mod">
-          <ac:chgData name="Brian" userId="a446eaa4-2b2b-40d1-a374-c5d2218596f9" providerId="ADAL" clId="{ABCD562D-4798-4A67-B3BE-E896E1B9131E}" dt="2020-07-22T14:17:45.117" v="4100" actId="255"/>
-          <ac:spMkLst>
-            <pc:docMk/>
-            <pc:sldMk cId="1036356753" sldId="606"/>
-            <ac:spMk id="14" creationId="{EF5B4CFB-A86C-4924-8AB2-7D7C31BC32A6}"/>
-          </ac:spMkLst>
-        </pc:spChg>
-        <pc:picChg chg="add mod">
-          <ac:chgData name="Brian" userId="a446eaa4-2b2b-40d1-a374-c5d2218596f9" providerId="ADAL" clId="{ABCD562D-4798-4A67-B3BE-E896E1B9131E}" dt="2020-07-22T14:10:37.744" v="3394" actId="1036"/>
-          <ac:picMkLst>
-            <pc:docMk/>
-            <pc:sldMk cId="1036356753" sldId="606"/>
-            <ac:picMk id="4" creationId="{5240195C-AEEC-4788-9ED7-15393AD6F4E1}"/>
-          </ac:picMkLst>
-        </pc:picChg>
-        <pc:picChg chg="del mod">
-          <ac:chgData name="Brian" userId="a446eaa4-2b2b-40d1-a374-c5d2218596f9" providerId="ADAL" clId="{ABCD562D-4798-4A67-B3BE-E896E1B9131E}" dt="2020-07-22T14:10:20.289" v="3365" actId="478"/>
-          <ac:picMkLst>
-            <pc:docMk/>
-            <pc:sldMk cId="1036356753" sldId="606"/>
-            <ac:picMk id="6" creationId="{35A80293-6B21-4B67-8959-0CF27DEA1B59}"/>
-          </ac:picMkLst>
-        </pc:picChg>
-        <pc:picChg chg="add mod">
-          <ac:chgData name="Brian" userId="a446eaa4-2b2b-40d1-a374-c5d2218596f9" providerId="ADAL" clId="{ABCD562D-4798-4A67-B3BE-E896E1B9131E}" dt="2020-07-22T14:11:20.752" v="3409" actId="1036"/>
-          <ac:picMkLst>
-            <pc:docMk/>
-            <pc:sldMk cId="1036356753" sldId="606"/>
-            <ac:picMk id="9" creationId="{0FC28D50-E3F0-4E60-AB58-76FFCFE17EA9}"/>
-          </ac:picMkLst>
-        </pc:picChg>
-      </pc:sldChg>
-      <pc:sldChg chg="add del ord">
-        <pc:chgData name="Brian" userId="a446eaa4-2b2b-40d1-a374-c5d2218596f9" providerId="ADAL" clId="{ABCD562D-4798-4A67-B3BE-E896E1B9131E}" dt="2020-07-23T19:54:29.730" v="4455" actId="47"/>
-        <pc:sldMkLst>
-          <pc:docMk/>
-          <pc:sldMk cId="2514657014" sldId="607"/>
-        </pc:sldMkLst>
-      </pc:sldChg>
-      <pc:sldChg chg="modSp add del mod">
-        <pc:chgData name="Brian" userId="a446eaa4-2b2b-40d1-a374-c5d2218596f9" providerId="ADAL" clId="{ABCD562D-4798-4A67-B3BE-E896E1B9131E}" dt="2020-07-24T04:12:50.188" v="12632" actId="47"/>
-        <pc:sldMkLst>
-          <pc:docMk/>
-          <pc:sldMk cId="19568453" sldId="608"/>
-        </pc:sldMkLst>
-        <pc:spChg chg="mod">
-          <ac:chgData name="Brian" userId="a446eaa4-2b2b-40d1-a374-c5d2218596f9" providerId="ADAL" clId="{ABCD562D-4798-4A67-B3BE-E896E1B9131E}" dt="2020-07-23T14:30:25.691" v="4215" actId="20577"/>
-          <ac:spMkLst>
-            <pc:docMk/>
-            <pc:sldMk cId="19568453" sldId="608"/>
-            <ac:spMk id="2" creationId="{347BC2CA-3CCA-4704-BAB4-82F3517B63FD}"/>
-          </ac:spMkLst>
-        </pc:spChg>
-        <pc:spChg chg="mod">
-          <ac:chgData name="Brian" userId="a446eaa4-2b2b-40d1-a374-c5d2218596f9" providerId="ADAL" clId="{ABCD562D-4798-4A67-B3BE-E896E1B9131E}" dt="2020-07-23T15:34:19.988" v="4271" actId="6549"/>
-          <ac:spMkLst>
-            <pc:docMk/>
-            <pc:sldMk cId="19568453" sldId="608"/>
-            <ac:spMk id="8" creationId="{04984240-606D-4298-B612-2249915719CE}"/>
-          </ac:spMkLst>
-        </pc:spChg>
-      </pc:sldChg>
-      <pc:sldChg chg="addSp modSp add mod">
-        <pc:chgData name="Brian" userId="a446eaa4-2b2b-40d1-a374-c5d2218596f9" providerId="ADAL" clId="{ABCD562D-4798-4A67-B3BE-E896E1B9131E}" dt="2020-07-24T03:50:37.077" v="10397" actId="6549"/>
-        <pc:sldMkLst>
-          <pc:docMk/>
-          <pc:sldMk cId="114985560" sldId="609"/>
-        </pc:sldMkLst>
-        <pc:spChg chg="mod">
-          <ac:chgData name="Brian" userId="a446eaa4-2b2b-40d1-a374-c5d2218596f9" providerId="ADAL" clId="{ABCD562D-4798-4A67-B3BE-E896E1B9131E}" dt="2020-07-24T03:40:11.543" v="9363" actId="14100"/>
-          <ac:spMkLst>
-            <pc:docMk/>
-            <pc:sldMk cId="114985560" sldId="609"/>
-            <ac:spMk id="2" creationId="{347BC2CA-3CCA-4704-BAB4-82F3517B63FD}"/>
-          </ac:spMkLst>
-        </pc:spChg>
-        <pc:spChg chg="mod">
-          <ac:chgData name="Brian" userId="a446eaa4-2b2b-40d1-a374-c5d2218596f9" providerId="ADAL" clId="{ABCD562D-4798-4A67-B3BE-E896E1B9131E}" dt="2020-07-24T03:50:37.077" v="10397" actId="6549"/>
-          <ac:spMkLst>
-            <pc:docMk/>
-            <pc:sldMk cId="114985560" sldId="609"/>
-            <ac:spMk id="8" creationId="{04984240-606D-4298-B612-2249915719CE}"/>
-          </ac:spMkLst>
-        </pc:spChg>
-        <pc:picChg chg="add mod">
-          <ac:chgData name="Brian" userId="a446eaa4-2b2b-40d1-a374-c5d2218596f9" providerId="ADAL" clId="{ABCD562D-4798-4A67-B3BE-E896E1B9131E}" dt="2020-07-24T03:40:26.886" v="9366" actId="1076"/>
-          <ac:picMkLst>
-            <pc:docMk/>
-            <pc:sldMk cId="114985560" sldId="609"/>
-            <ac:picMk id="3" creationId="{609C011C-6365-42FB-AFA2-ADAC8F1935BF}"/>
-          </ac:picMkLst>
-        </pc:picChg>
-      </pc:sldChg>
-      <pc:sldChg chg="modSp add mod">
-        <pc:chgData name="Brian" userId="a446eaa4-2b2b-40d1-a374-c5d2218596f9" providerId="ADAL" clId="{ABCD562D-4798-4A67-B3BE-E896E1B9131E}" dt="2020-07-23T21:01:42.408" v="5357" actId="14100"/>
-        <pc:sldMkLst>
-          <pc:docMk/>
-          <pc:sldMk cId="1731920811" sldId="610"/>
-        </pc:sldMkLst>
-        <pc:spChg chg="mod">
-          <ac:chgData name="Brian" userId="a446eaa4-2b2b-40d1-a374-c5d2218596f9" providerId="ADAL" clId="{ABCD562D-4798-4A67-B3BE-E896E1B9131E}" dt="2020-07-23T19:56:08.958" v="4607" actId="20577"/>
-          <ac:spMkLst>
-            <pc:docMk/>
-            <pc:sldMk cId="1731920811" sldId="610"/>
-            <ac:spMk id="2" creationId="{347BC2CA-3CCA-4704-BAB4-82F3517B63FD}"/>
-          </ac:spMkLst>
-        </pc:spChg>
-        <pc:spChg chg="mod">
-          <ac:chgData name="Brian" userId="a446eaa4-2b2b-40d1-a374-c5d2218596f9" providerId="ADAL" clId="{ABCD562D-4798-4A67-B3BE-E896E1B9131E}" dt="2020-07-23T21:01:42.408" v="5357" actId="14100"/>
-          <ac:spMkLst>
-            <pc:docMk/>
-            <pc:sldMk cId="1731920811" sldId="610"/>
-            <ac:spMk id="6" creationId="{0C461184-E5D7-45D3-A5D9-9756EE6F702C}"/>
-          </ac:spMkLst>
-        </pc:spChg>
-      </pc:sldChg>
-      <pc:sldChg chg="add del">
-        <pc:chgData name="Brian" userId="a446eaa4-2b2b-40d1-a374-c5d2218596f9" providerId="ADAL" clId="{ABCD562D-4798-4A67-B3BE-E896E1B9131E}" dt="2020-07-24T03:34:39.815" v="9195" actId="47"/>
-        <pc:sldMkLst>
-          <pc:docMk/>
-          <pc:sldMk cId="214157785" sldId="611"/>
-        </pc:sldMkLst>
-      </pc:sldChg>
-      <pc:sldChg chg="modSp add mod">
-        <pc:chgData name="Brian" userId="a446eaa4-2b2b-40d1-a374-c5d2218596f9" providerId="ADAL" clId="{ABCD562D-4798-4A67-B3BE-E896E1B9131E}" dt="2020-07-24T03:39:06.381" v="9301" actId="403"/>
-        <pc:sldMkLst>
-          <pc:docMk/>
-          <pc:sldMk cId="613388980" sldId="612"/>
-        </pc:sldMkLst>
-        <pc:spChg chg="mod">
-          <ac:chgData name="Brian" userId="a446eaa4-2b2b-40d1-a374-c5d2218596f9" providerId="ADAL" clId="{ABCD562D-4798-4A67-B3BE-E896E1B9131E}" dt="2020-07-24T03:35:36.900" v="9226" actId="20577"/>
-          <ac:spMkLst>
-            <pc:docMk/>
-            <pc:sldMk cId="613388980" sldId="612"/>
-            <ac:spMk id="2" creationId="{347BC2CA-3CCA-4704-BAB4-82F3517B63FD}"/>
-          </ac:spMkLst>
-        </pc:spChg>
-        <pc:spChg chg="mod">
-          <ac:chgData name="Brian" userId="a446eaa4-2b2b-40d1-a374-c5d2218596f9" providerId="ADAL" clId="{ABCD562D-4798-4A67-B3BE-E896E1B9131E}" dt="2020-07-24T03:39:06.381" v="9301" actId="403"/>
-          <ac:spMkLst>
-            <pc:docMk/>
-            <pc:sldMk cId="613388980" sldId="612"/>
-            <ac:spMk id="8" creationId="{04984240-606D-4298-B612-2249915719CE}"/>
-          </ac:spMkLst>
-        </pc:spChg>
-      </pc:sldChg>
-      <pc:sldChg chg="addSp delSp modSp add mod ord">
-        <pc:chgData name="Brian" userId="a446eaa4-2b2b-40d1-a374-c5d2218596f9" providerId="ADAL" clId="{ABCD562D-4798-4A67-B3BE-E896E1B9131E}" dt="2020-07-23T21:31:38.957" v="7910" actId="1076"/>
-        <pc:sldMkLst>
-          <pc:docMk/>
-          <pc:sldMk cId="2224488660" sldId="613"/>
-        </pc:sldMkLst>
-        <pc:spChg chg="mod">
-          <ac:chgData name="Brian" userId="a446eaa4-2b2b-40d1-a374-c5d2218596f9" providerId="ADAL" clId="{ABCD562D-4798-4A67-B3BE-E896E1B9131E}" dt="2020-07-23T21:18:52.092" v="6650" actId="1036"/>
-          <ac:spMkLst>
-            <pc:docMk/>
-            <pc:sldMk cId="2224488660" sldId="613"/>
-            <ac:spMk id="2" creationId="{347BC2CA-3CCA-4704-BAB4-82F3517B63FD}"/>
-          </ac:spMkLst>
-        </pc:spChg>
-        <pc:spChg chg="mod">
-          <ac:chgData name="Brian" userId="a446eaa4-2b2b-40d1-a374-c5d2218596f9" providerId="ADAL" clId="{ABCD562D-4798-4A67-B3BE-E896E1B9131E}" dt="2020-07-23T21:28:26.965" v="7641" actId="20577"/>
-          <ac:spMkLst>
-            <pc:docMk/>
-            <pc:sldMk cId="2224488660" sldId="613"/>
-            <ac:spMk id="8" creationId="{04984240-606D-4298-B612-2249915719CE}"/>
-          </ac:spMkLst>
-        </pc:spChg>
-        <pc:picChg chg="add mod">
-          <ac:chgData name="Brian" userId="a446eaa4-2b2b-40d1-a374-c5d2218596f9" providerId="ADAL" clId="{ABCD562D-4798-4A67-B3BE-E896E1B9131E}" dt="2020-07-23T21:18:58.113" v="6670" actId="1038"/>
-          <ac:picMkLst>
-            <pc:docMk/>
-            <pc:sldMk cId="2224488660" sldId="613"/>
-            <ac:picMk id="4" creationId="{8A5869E6-6049-44EA-9AAB-C95867AF4B6A}"/>
-          </ac:picMkLst>
-        </pc:picChg>
-        <pc:picChg chg="add del mod">
-          <ac:chgData name="Brian" userId="a446eaa4-2b2b-40d1-a374-c5d2218596f9" providerId="ADAL" clId="{ABCD562D-4798-4A67-B3BE-E896E1B9131E}" dt="2020-07-23T21:18:34.652" v="6624" actId="478"/>
-          <ac:picMkLst>
-            <pc:docMk/>
-            <pc:sldMk cId="2224488660" sldId="613"/>
-            <ac:picMk id="7" creationId="{8107A6E8-5D51-4556-9400-778D471BF7A0}"/>
-          </ac:picMkLst>
-        </pc:picChg>
-        <pc:picChg chg="add del mod">
-          <ac:chgData name="Brian" userId="a446eaa4-2b2b-40d1-a374-c5d2218596f9" providerId="ADAL" clId="{ABCD562D-4798-4A67-B3BE-E896E1B9131E}" dt="2020-07-23T21:27:36.453" v="7544" actId="478"/>
-          <ac:picMkLst>
-            <pc:docMk/>
-            <pc:sldMk cId="2224488660" sldId="613"/>
-            <ac:picMk id="10" creationId="{16B49FE2-75EA-4A09-80B5-DBF8706A9CA2}"/>
-          </ac:picMkLst>
-        </pc:picChg>
-        <pc:picChg chg="add del mod">
-          <ac:chgData name="Brian" userId="a446eaa4-2b2b-40d1-a374-c5d2218596f9" providerId="ADAL" clId="{ABCD562D-4798-4A67-B3BE-E896E1B9131E}" dt="2020-07-23T21:31:35.012" v="7908" actId="478"/>
-          <ac:picMkLst>
-            <pc:docMk/>
-            <pc:sldMk cId="2224488660" sldId="613"/>
-            <ac:picMk id="12" creationId="{3A2FDE7A-0C88-41B1-869B-29471CE1D26E}"/>
-          </ac:picMkLst>
-        </pc:picChg>
-        <pc:picChg chg="add mod">
-          <ac:chgData name="Brian" userId="a446eaa4-2b2b-40d1-a374-c5d2218596f9" providerId="ADAL" clId="{ABCD562D-4798-4A67-B3BE-E896E1B9131E}" dt="2020-07-23T21:31:38.957" v="7910" actId="1076"/>
-          <ac:picMkLst>
-            <pc:docMk/>
-            <pc:sldMk cId="2224488660" sldId="613"/>
-            <ac:picMk id="14" creationId="{0F3EC5B3-ED97-49B2-91A6-9CD1F51CD3BF}"/>
-          </ac:picMkLst>
-        </pc:picChg>
-      </pc:sldChg>
-      <pc:sldChg chg="add del">
-        <pc:chgData name="Brian" userId="a446eaa4-2b2b-40d1-a374-c5d2218596f9" providerId="ADAL" clId="{ABCD562D-4798-4A67-B3BE-E896E1B9131E}" dt="2020-07-23T21:15:00.873" v="6610" actId="47"/>
-        <pc:sldMkLst>
-          <pc:docMk/>
-          <pc:sldMk cId="2563832161" sldId="613"/>
-        </pc:sldMkLst>
-      </pc:sldChg>
-      <pc:sldChg chg="addSp delSp modSp add mod">
-        <pc:chgData name="Brian" userId="a446eaa4-2b2b-40d1-a374-c5d2218596f9" providerId="ADAL" clId="{ABCD562D-4798-4A67-B3BE-E896E1B9131E}" dt="2020-07-23T21:31:59.980" v="7922" actId="1037"/>
-        <pc:sldMkLst>
-          <pc:docMk/>
-          <pc:sldMk cId="3257844464" sldId="614"/>
-        </pc:sldMkLst>
-        <pc:spChg chg="mod">
-          <ac:chgData name="Brian" userId="a446eaa4-2b2b-40d1-a374-c5d2218596f9" providerId="ADAL" clId="{ABCD562D-4798-4A67-B3BE-E896E1B9131E}" dt="2020-07-23T21:24:20.773" v="7292" actId="20577"/>
-          <ac:spMkLst>
-            <pc:docMk/>
-            <pc:sldMk cId="3257844464" sldId="614"/>
-            <ac:spMk id="2" creationId="{347BC2CA-3CCA-4704-BAB4-82F3517B63FD}"/>
-          </ac:spMkLst>
-        </pc:spChg>
-        <pc:spChg chg="mod">
-          <ac:chgData name="Brian" userId="a446eaa4-2b2b-40d1-a374-c5d2218596f9" providerId="ADAL" clId="{ABCD562D-4798-4A67-B3BE-E896E1B9131E}" dt="2020-07-23T21:29:52.356" v="7847" actId="20577"/>
-          <ac:spMkLst>
-            <pc:docMk/>
-            <pc:sldMk cId="3257844464" sldId="614"/>
-            <ac:spMk id="8" creationId="{04984240-606D-4298-B612-2249915719CE}"/>
-          </ac:spMkLst>
-        </pc:spChg>
-        <pc:picChg chg="del">
-          <ac:chgData name="Brian" userId="a446eaa4-2b2b-40d1-a374-c5d2218596f9" providerId="ADAL" clId="{ABCD562D-4798-4A67-B3BE-E896E1B9131E}" dt="2020-07-23T21:30:04.181" v="7848" actId="478"/>
-          <ac:picMkLst>
-            <pc:docMk/>
-            <pc:sldMk cId="3257844464" sldId="614"/>
-            <ac:picMk id="4" creationId="{8A5869E6-6049-44EA-9AAB-C95867AF4B6A}"/>
-          </ac:picMkLst>
-        </pc:picChg>
-        <pc:picChg chg="add mod">
-          <ac:chgData name="Brian" userId="a446eaa4-2b2b-40d1-a374-c5d2218596f9" providerId="ADAL" clId="{ABCD562D-4798-4A67-B3BE-E896E1B9131E}" dt="2020-07-23T21:31:59.980" v="7922" actId="1037"/>
-          <ac:picMkLst>
-            <pc:docMk/>
-            <pc:sldMk cId="3257844464" sldId="614"/>
-            <ac:picMk id="6" creationId="{CB49778C-19C2-4A08-B5C1-43CE6E682564}"/>
-          </ac:picMkLst>
-        </pc:picChg>
-        <pc:picChg chg="add del mod">
-          <ac:chgData name="Brian" userId="a446eaa4-2b2b-40d1-a374-c5d2218596f9" providerId="ADAL" clId="{ABCD562D-4798-4A67-B3BE-E896E1B9131E}" dt="2020-07-23T21:31:07.612" v="7887" actId="478"/>
-          <ac:picMkLst>
-            <pc:docMk/>
-            <pc:sldMk cId="3257844464" sldId="614"/>
-            <ac:picMk id="9" creationId="{BC523C99-9AA8-4A75-9F79-BEE35DC6B379}"/>
-          </ac:picMkLst>
-        </pc:picChg>
-        <pc:picChg chg="del">
-          <ac:chgData name="Brian" userId="a446eaa4-2b2b-40d1-a374-c5d2218596f9" providerId="ADAL" clId="{ABCD562D-4798-4A67-B3BE-E896E1B9131E}" dt="2020-07-23T21:30:05.821" v="7849" actId="478"/>
-          <ac:picMkLst>
-            <pc:docMk/>
-            <pc:sldMk cId="3257844464" sldId="614"/>
-            <ac:picMk id="10" creationId="{16B49FE2-75EA-4A09-80B5-DBF8706A9CA2}"/>
-          </ac:picMkLst>
-        </pc:picChg>
-        <pc:picChg chg="add mod">
-          <ac:chgData name="Brian" userId="a446eaa4-2b2b-40d1-a374-c5d2218596f9" providerId="ADAL" clId="{ABCD562D-4798-4A67-B3BE-E896E1B9131E}" dt="2020-07-23T21:31:59.980" v="7922" actId="1037"/>
-          <ac:picMkLst>
-            <pc:docMk/>
-            <pc:sldMk cId="3257844464" sldId="614"/>
-            <ac:picMk id="12" creationId="{3A194D46-1F1A-489C-A2B5-47DA4A8FA0DB}"/>
-          </ac:picMkLst>
-        </pc:picChg>
-      </pc:sldChg>
-      <pc:sldChg chg="addSp modSp add mod modAnim">
-        <pc:chgData name="Brian" userId="a446eaa4-2b2b-40d1-a374-c5d2218596f9" providerId="ADAL" clId="{ABCD562D-4798-4A67-B3BE-E896E1B9131E}" dt="2020-07-24T02:01:09.296" v="8472" actId="14100"/>
-        <pc:sldMkLst>
-          <pc:docMk/>
-          <pc:sldMk cId="2844177406" sldId="615"/>
-        </pc:sldMkLst>
-        <pc:spChg chg="mod">
-          <ac:chgData name="Brian" userId="a446eaa4-2b2b-40d1-a374-c5d2218596f9" providerId="ADAL" clId="{ABCD562D-4798-4A67-B3BE-E896E1B9131E}" dt="2020-07-24T01:54:37.346" v="7985" actId="20577"/>
-          <ac:spMkLst>
-            <pc:docMk/>
-            <pc:sldMk cId="2844177406" sldId="615"/>
-            <ac:spMk id="2" creationId="{347BC2CA-3CCA-4704-BAB4-82F3517B63FD}"/>
-          </ac:spMkLst>
-        </pc:spChg>
-        <pc:spChg chg="add mod">
-          <ac:chgData name="Brian" userId="a446eaa4-2b2b-40d1-a374-c5d2218596f9" providerId="ADAL" clId="{ABCD562D-4798-4A67-B3BE-E896E1B9131E}" dt="2020-07-24T02:01:09.296" v="8472" actId="14100"/>
-          <ac:spMkLst>
-            <pc:docMk/>
-            <pc:sldMk cId="2844177406" sldId="615"/>
-            <ac:spMk id="7" creationId="{7C9D716E-415A-4958-8804-59F6527BC224}"/>
-          </ac:spMkLst>
-        </pc:spChg>
-        <pc:spChg chg="mod">
-          <ac:chgData name="Brian" userId="a446eaa4-2b2b-40d1-a374-c5d2218596f9" providerId="ADAL" clId="{ABCD562D-4798-4A67-B3BE-E896E1B9131E}" dt="2020-07-24T02:00:54.443" v="8470" actId="114"/>
-          <ac:spMkLst>
-            <pc:docMk/>
-            <pc:sldMk cId="2844177406" sldId="615"/>
-            <ac:spMk id="8" creationId="{04984240-606D-4298-B612-2249915719CE}"/>
-          </ac:spMkLst>
-        </pc:spChg>
-        <pc:picChg chg="add mod">
-          <ac:chgData name="Brian" userId="a446eaa4-2b2b-40d1-a374-c5d2218596f9" providerId="ADAL" clId="{ABCD562D-4798-4A67-B3BE-E896E1B9131E}" dt="2020-07-24T01:57:21.507" v="8002" actId="1038"/>
-          <ac:picMkLst>
-            <pc:docMk/>
-            <pc:sldMk cId="2844177406" sldId="615"/>
-            <ac:picMk id="4" creationId="{EC4BF7D3-1A15-412C-94B0-8A8394DDE723}"/>
-          </ac:picMkLst>
-        </pc:picChg>
-      </pc:sldChg>
-      <pc:sldChg chg="addSp delSp modSp add mod">
-        <pc:chgData name="Brian" userId="a446eaa4-2b2b-40d1-a374-c5d2218596f9" providerId="ADAL" clId="{ABCD562D-4798-4A67-B3BE-E896E1B9131E}" dt="2020-07-24T04:07:04.571" v="11958" actId="207"/>
-        <pc:sldMkLst>
-          <pc:docMk/>
-          <pc:sldMk cId="2945989702" sldId="616"/>
-        </pc:sldMkLst>
-        <pc:spChg chg="mod">
-          <ac:chgData name="Brian" userId="a446eaa4-2b2b-40d1-a374-c5d2218596f9" providerId="ADAL" clId="{ABCD562D-4798-4A67-B3BE-E896E1B9131E}" dt="2020-07-24T03:53:14.900" v="10403" actId="20577"/>
-          <ac:spMkLst>
-            <pc:docMk/>
-            <pc:sldMk cId="2945989702" sldId="616"/>
-            <ac:spMk id="2" creationId="{347BC2CA-3CCA-4704-BAB4-82F3517B63FD}"/>
-          </ac:spMkLst>
-        </pc:spChg>
-        <pc:spChg chg="mod">
-          <ac:chgData name="Brian" userId="a446eaa4-2b2b-40d1-a374-c5d2218596f9" providerId="ADAL" clId="{ABCD562D-4798-4A67-B3BE-E896E1B9131E}" dt="2020-07-24T04:07:04.571" v="11958" actId="207"/>
-          <ac:spMkLst>
-            <pc:docMk/>
-            <pc:sldMk cId="2945989702" sldId="616"/>
-            <ac:spMk id="8" creationId="{04984240-606D-4298-B612-2249915719CE}"/>
-          </ac:spMkLst>
-        </pc:spChg>
-        <pc:picChg chg="add del">
-          <ac:chgData name="Brian" userId="a446eaa4-2b2b-40d1-a374-c5d2218596f9" providerId="ADAL" clId="{ABCD562D-4798-4A67-B3BE-E896E1B9131E}" dt="2020-07-24T03:54:42.300" v="10507" actId="478"/>
-          <ac:picMkLst>
-            <pc:docMk/>
-            <pc:sldMk cId="2945989702" sldId="616"/>
-            <ac:picMk id="3" creationId="{609C011C-6365-42FB-AFA2-ADAC8F1935BF}"/>
-          </ac:picMkLst>
-        </pc:picChg>
-        <pc:picChg chg="add mod">
-          <ac:chgData name="Brian" userId="a446eaa4-2b2b-40d1-a374-c5d2218596f9" providerId="ADAL" clId="{ABCD562D-4798-4A67-B3BE-E896E1B9131E}" dt="2020-07-24T03:55:04.763" v="10520" actId="1038"/>
-          <ac:picMkLst>
-            <pc:docMk/>
-            <pc:sldMk cId="2945989702" sldId="616"/>
-            <ac:picMk id="4" creationId="{153A16E6-4902-406C-94D0-B8327D38B156}"/>
-          </ac:picMkLst>
-        </pc:picChg>
-        <pc:picChg chg="add del">
-          <ac:chgData name="Brian" userId="a446eaa4-2b2b-40d1-a374-c5d2218596f9" providerId="ADAL" clId="{ABCD562D-4798-4A67-B3BE-E896E1B9131E}" dt="2020-07-24T03:55:58.533" v="10651" actId="22"/>
-          <ac:picMkLst>
-            <pc:docMk/>
-            <pc:sldMk cId="2945989702" sldId="616"/>
-            <ac:picMk id="7" creationId="{3CF54A58-B9A3-4222-B9F4-E5AD48463130}"/>
-          </ac:picMkLst>
-        </pc:picChg>
-      </pc:sldChg>
-      <pc:sldChg chg="modSp add mod">
-        <pc:chgData name="Brian" userId="a446eaa4-2b2b-40d1-a374-c5d2218596f9" providerId="ADAL" clId="{ABCD562D-4798-4A67-B3BE-E896E1B9131E}" dt="2020-07-24T04:12:45.459" v="12631" actId="207"/>
-        <pc:sldMkLst>
-          <pc:docMk/>
-          <pc:sldMk cId="320647891" sldId="617"/>
-        </pc:sldMkLst>
-        <pc:spChg chg="mod">
-          <ac:chgData name="Brian" userId="a446eaa4-2b2b-40d1-a374-c5d2218596f9" providerId="ADAL" clId="{ABCD562D-4798-4A67-B3BE-E896E1B9131E}" dt="2020-07-24T04:08:15.557" v="12048" actId="20577"/>
-          <ac:spMkLst>
-            <pc:docMk/>
-            <pc:sldMk cId="320647891" sldId="617"/>
-            <ac:spMk id="2" creationId="{347BC2CA-3CCA-4704-BAB4-82F3517B63FD}"/>
-          </ac:spMkLst>
-        </pc:spChg>
-        <pc:spChg chg="mod">
-          <ac:chgData name="Brian" userId="a446eaa4-2b2b-40d1-a374-c5d2218596f9" providerId="ADAL" clId="{ABCD562D-4798-4A67-B3BE-E896E1B9131E}" dt="2020-07-24T04:12:45.459" v="12631" actId="207"/>
-          <ac:spMkLst>
-            <pc:docMk/>
-            <pc:sldMk cId="320647891" sldId="617"/>
-            <ac:spMk id="8" creationId="{04984240-606D-4298-B612-2249915719CE}"/>
-          </ac:spMkLst>
-        </pc:spChg>
-      </pc:sldChg>
-      <pc:sldChg chg="modSp add mod">
-        <pc:chgData name="Brian" userId="a446eaa4-2b2b-40d1-a374-c5d2218596f9" providerId="ADAL" clId="{ABCD562D-4798-4A67-B3BE-E896E1B9131E}" dt="2020-07-24T04:18:25.102" v="13586" actId="27636"/>
-        <pc:sldMkLst>
-          <pc:docMk/>
-          <pc:sldMk cId="557312789" sldId="618"/>
-        </pc:sldMkLst>
-        <pc:spChg chg="mod">
-          <ac:chgData name="Brian" userId="a446eaa4-2b2b-40d1-a374-c5d2218596f9" providerId="ADAL" clId="{ABCD562D-4798-4A67-B3BE-E896E1B9131E}" dt="2020-07-24T04:13:19.413" v="12668" actId="20577"/>
-          <ac:spMkLst>
-            <pc:docMk/>
-            <pc:sldMk cId="557312789" sldId="618"/>
-            <ac:spMk id="2" creationId="{347BC2CA-3CCA-4704-BAB4-82F3517B63FD}"/>
-          </ac:spMkLst>
-        </pc:spChg>
-        <pc:spChg chg="mod">
-          <ac:chgData name="Brian" userId="a446eaa4-2b2b-40d1-a374-c5d2218596f9" providerId="ADAL" clId="{ABCD562D-4798-4A67-B3BE-E896E1B9131E}" dt="2020-07-24T04:18:25.102" v="13586" actId="27636"/>
-          <ac:spMkLst>
-            <pc:docMk/>
-            <pc:sldMk cId="557312789" sldId="618"/>
-            <ac:spMk id="8" creationId="{04984240-606D-4298-B612-2249915719CE}"/>
-          </ac:spMkLst>
-        </pc:spChg>
-      </pc:sldChg>
-      <pc:sldChg chg="add del">
-        <pc:chgData name="Brian" userId="a446eaa4-2b2b-40d1-a374-c5d2218596f9" providerId="ADAL" clId="{ABCD562D-4798-4A67-B3BE-E896E1B9131E}" dt="2020-07-24T04:07:50.250" v="12001" actId="22"/>
-        <pc:sldMkLst>
-          <pc:docMk/>
-          <pc:sldMk cId="3261258493" sldId="618"/>
-        </pc:sldMkLst>
-      </pc:sldChg>
-      <pc:sldChg chg="add del">
-        <pc:chgData name="Brian" userId="a446eaa4-2b2b-40d1-a374-c5d2218596f9" providerId="ADAL" clId="{ABCD562D-4798-4A67-B3BE-E896E1B9131E}" dt="2020-07-24T04:14:00.876" v="12780" actId="22"/>
-        <pc:sldMkLst>
-          <pc:docMk/>
-          <pc:sldMk cId="2072331742" sldId="619"/>
-        </pc:sldMkLst>
-      </pc:sldChg>
-    </pc:docChg>
-  </pc:docChgLst>
-</pc:chgInfo>
-</file>
-
 <file path=ppt/notesMasters/notesMaster1.xml><?xml version="1.0" encoding="utf-8"?>
 <p:notesMaster xmlns:a="http://schemas.openxmlformats.org/drawingml/2006/main" xmlns:r="http://schemas.openxmlformats.org/officeDocument/2006/relationships" xmlns:p="http://schemas.openxmlformats.org/presentationml/2006/main">
   <p:cSld>
@@ -2202,7 +264,7 @@
           <a:p>
             <a:fld id="{A5529470-F7A8-4398-A8EE-7FA53A742130}" type="datetimeFigureOut">
               <a:rPr lang="en-US" smtClean="0"/>
-              <a:t>8/7/2020</a:t>
+              <a:t>9/11/2020</a:t>
             </a:fld>
             <a:endParaRPr lang="en-US"/>
           </a:p>
@@ -2676,7 +738,7 @@
           <a:p>
             <a:fld id="{3A0ECD62-D53C-4B1C-A161-36F5266F165E}" type="datetime1">
               <a:rPr lang="en-US" smtClean="0"/>
-              <a:t>8/7/2020</a:t>
+              <a:t>9/11/2020</a:t>
             </a:fld>
             <a:endParaRPr lang="en-US"/>
           </a:p>
@@ -3014,7 +1076,7 @@
           <a:p>
             <a:fld id="{094E981E-B08F-4856-8D63-A350864EE466}" type="datetime1">
               <a:rPr lang="en-US" smtClean="0"/>
-              <a:t>8/7/2020</a:t>
+              <a:t>9/11/2020</a:t>
             </a:fld>
             <a:endParaRPr lang="en-US"/>
           </a:p>
@@ -3359,7 +1421,7 @@
           <a:p>
             <a:fld id="{AEA55179-344B-409D-9D49-2F865998A651}" type="datetime1">
               <a:rPr lang="en-US" smtClean="0"/>
-              <a:t>8/7/2020</a:t>
+              <a:t>9/11/2020</a:t>
             </a:fld>
             <a:endParaRPr lang="en-US"/>
           </a:p>
@@ -3697,7 +1759,7 @@
           <a:p>
             <a:fld id="{5BE34584-67BC-4477-8C8A-7EC8D88E3893}" type="datetime1">
               <a:rPr lang="en-US" smtClean="0"/>
-              <a:t>8/7/2020</a:t>
+              <a:t>9/11/2020</a:t>
             </a:fld>
             <a:endParaRPr lang="en-US"/>
           </a:p>
@@ -4098,7 +2160,7 @@
           <a:p>
             <a:fld id="{2CC85A34-25CF-47D2-ACF5-CB08A7038568}" type="datetime1">
               <a:rPr lang="en-US" smtClean="0"/>
-              <a:t>8/7/2020</a:t>
+              <a:t>9/11/2020</a:t>
             </a:fld>
             <a:endParaRPr lang="en-US"/>
           </a:p>
@@ -4434,7 +2496,7 @@
           <a:p>
             <a:fld id="{AE513C0E-443E-4A29-AC73-09213761DEA6}" type="datetime1">
               <a:rPr lang="en-US" smtClean="0"/>
-              <a:t>8/7/2020</a:t>
+              <a:t>9/11/2020</a:t>
             </a:fld>
             <a:endParaRPr lang="en-US"/>
           </a:p>
@@ -4754,7 +2816,7 @@
           <a:p>
             <a:fld id="{7E4E5EB2-70F5-485F-A3B7-447265FD33A1}" type="datetime1">
               <a:rPr lang="en-US" smtClean="0"/>
-              <a:t>8/7/2020</a:t>
+              <a:t>9/11/2020</a:t>
             </a:fld>
             <a:endParaRPr lang="en-US"/>
           </a:p>
@@ -5150,7 +3212,7 @@
           <a:p>
             <a:fld id="{20EC1EC6-9490-4F3E-9451-807B4A4A4480}" type="datetime1">
               <a:rPr lang="en-US" smtClean="0"/>
-              <a:t>8/7/2020</a:t>
+              <a:t>9/11/2020</a:t>
             </a:fld>
             <a:endParaRPr lang="en-US"/>
           </a:p>
@@ -5407,7 +3469,7 @@
           <a:p>
             <a:fld id="{DA2FDD43-E092-4EE0-A4FB-0A433C09A57F}" type="datetime1">
               <a:rPr lang="en-US" smtClean="0"/>
-              <a:t>8/7/2020</a:t>
+              <a:t>9/11/2020</a:t>
             </a:fld>
             <a:endParaRPr lang="en-US"/>
           </a:p>
@@ -5669,7 +3731,7 @@
           <a:p>
             <a:fld id="{C5B3B320-1390-4058-A5C1-64E4789F10F3}" type="datetime1">
               <a:rPr lang="en-US" smtClean="0"/>
-              <a:t>8/7/2020</a:t>
+              <a:t>9/11/2020</a:t>
             </a:fld>
             <a:endParaRPr lang="en-US"/>
           </a:p>
@@ -5931,7 +3993,7 @@
           <a:p>
             <a:fld id="{1FFB48BB-2FEA-45E4-8475-C13EB5303665}" type="datetime1">
               <a:rPr lang="en-US" smtClean="0"/>
-              <a:t>8/7/2020</a:t>
+              <a:t>9/11/2020</a:t>
             </a:fld>
             <a:endParaRPr lang="en-US"/>
           </a:p>
@@ -6026,7 +4088,7 @@
           <a:p>
             <a:fld id="{745DA0C8-6E1B-4BB8-980D-2FD8617F722B}" type="datetime1">
               <a:rPr lang="en-US" smtClean="0"/>
-              <a:t>8/7/2020</a:t>
+              <a:t>9/11/2020</a:t>
             </a:fld>
             <a:endParaRPr lang="en-US"/>
           </a:p>
@@ -6480,7 +4542,7 @@
           <a:p>
             <a:fld id="{F3268E0D-E29A-487C-BA79-4B5B5992A623}" type="datetime1">
               <a:rPr lang="en-US" smtClean="0"/>
-              <a:t>8/7/2020</a:t>
+              <a:t>9/11/2020</a:t>
             </a:fld>
             <a:endParaRPr lang="en-US"/>
           </a:p>
@@ -6803,7 +4865,7 @@
           <a:p>
             <a:fld id="{A60176B0-24AE-4431-99F9-C59EB1ABF796}" type="datetime1">
               <a:rPr lang="en-US" smtClean="0"/>
-              <a:t>8/7/2020</a:t>
+              <a:t>9/11/2020</a:t>
             </a:fld>
             <a:endParaRPr lang="en-US"/>
           </a:p>
@@ -7127,7 +5189,7 @@
           <a:p>
             <a:fld id="{32A96F2C-23C5-44FA-ADB3-C5CD7E8AB19E}" type="datetime1">
               <a:rPr lang="en-US" smtClean="0"/>
-              <a:t>8/7/2020</a:t>
+              <a:t>9/11/2020</a:t>
             </a:fld>
             <a:endParaRPr lang="en-US"/>
           </a:p>
@@ -7458,7 +5520,7 @@
           <a:p>
             <a:fld id="{984309DC-CB83-4640-AB9C-48DAEACD4B19}" type="datetime1">
               <a:rPr lang="en-US" smtClean="0"/>
-              <a:t>8/7/2020</a:t>
+              <a:t>9/11/2020</a:t>
             </a:fld>
             <a:endParaRPr lang="en-US"/>
           </a:p>
@@ -8069,7 +6131,7 @@
           <a:p>
             <a:fld id="{4518588B-9E26-4774-BCE2-ABE3DBC3A586}" type="datetime1">
               <a:rPr lang="en-US" smtClean="0"/>
-              <a:t>8/7/2020</a:t>
+              <a:t>9/11/2020</a:t>
             </a:fld>
             <a:endParaRPr lang="en-US"/>
           </a:p>
@@ -8274,7 +6336,7 @@
           <a:p>
             <a:fld id="{F971B097-8B27-43BB-95B2-DE6FA28AF0EE}" type="datetime1">
               <a:rPr lang="en-US" smtClean="0"/>
-              <a:t>8/7/2020</a:t>
+              <a:t>9/11/2020</a:t>
             </a:fld>
             <a:endParaRPr lang="en-US"/>
           </a:p>
@@ -8451,7 +6513,7 @@
           <a:p>
             <a:fld id="{506A1DAC-9BC9-4E94-ACA5-C75B424E35EC}" type="datetime1">
               <a:rPr lang="en-US" smtClean="0"/>
-              <a:t>8/7/2020</a:t>
+              <a:t>9/11/2020</a:t>
             </a:fld>
             <a:endParaRPr lang="en-US"/>
           </a:p>
@@ -10563,7 +8625,7 @@
           <a:p>
             <a:fld id="{6978CC70-F3CB-4DCC-8C5B-A025E3D4DA1A}" type="datetime1">
               <a:rPr lang="en-US" smtClean="0"/>
-              <a:t>8/7/2020</a:t>
+              <a:t>9/11/2020</a:t>
             </a:fld>
             <a:endParaRPr lang="en-US"/>
           </a:p>

</xml_diff>